<commit_message>
Add some small updates to the pptx
</commit_message>
<xml_diff>
--- a/Doku/SAV2_Projekt_Reinberger.pptx
+++ b/Doku/SAV2_Projekt_Reinberger.pptx
@@ -228,7 +228,7 @@
             <a:pPr rtl="0"/>
             <a:fld id="{754A2EA4-0B56-441C-A9D3-5AD09C9F1422}" type="datetime1">
               <a:rPr lang="de-DE" smtClean="0"/>
-              <a:t>20.06.2024</a:t>
+              <a:t>21.06.2024</a:t>
             </a:fld>
             <a:endParaRPr lang="de-DE"/>
           </a:p>
@@ -410,7 +410,7 @@
             <a:fld id="{01B085CE-6145-404E-B599-68FDF26648DF}" type="datetime1">
               <a:rPr lang="de-DE" smtClean="0"/>
               <a:pPr/>
-              <a:t>20.06.2024</a:t>
+              <a:t>21.06.2024</a:t>
             </a:fld>
             <a:endParaRPr lang="de-DE" dirty="0"/>
           </a:p>
@@ -726,7 +726,7 @@
           <a:lstStyle/>
           <a:p>
             <a:pPr rtl="0"/>
-            <a:endParaRPr lang="de-DE"/>
+            <a:endParaRPr lang="de-DE" dirty="0"/>
           </a:p>
         </p:txBody>
       </p:sp>
@@ -1098,7 +1098,7 @@
             <a:pPr rtl="0"/>
             <a:fld id="{8F002A91-693E-4088-9FA9-6ABC518881A7}" type="datetime1">
               <a:rPr lang="de-DE" noProof="0" smtClean="0"/>
-              <a:t>20.06.2024</a:t>
+              <a:t>21.06.2024</a:t>
             </a:fld>
             <a:endParaRPr lang="de-DE" noProof="0"/>
           </a:p>
@@ -1366,7 +1366,7 @@
             <a:pPr rtl="0"/>
             <a:fld id="{A65750D7-EC48-4710-8C8A-E4B4B7BF1371}" type="datetime1">
               <a:rPr lang="de-DE" noProof="0" smtClean="0"/>
-              <a:t>20.06.2024</a:t>
+              <a:t>21.06.2024</a:t>
             </a:fld>
             <a:endParaRPr lang="de-DE" noProof="0"/>
           </a:p>
@@ -1607,7 +1607,7 @@
             <a:pPr rtl="0"/>
             <a:fld id="{F7F63DFD-2FA5-406F-B01B-00F01DCF8725}" type="datetime1">
               <a:rPr lang="de-DE" noProof="0" smtClean="0"/>
-              <a:t>20.06.2024</a:t>
+              <a:t>21.06.2024</a:t>
             </a:fld>
             <a:endParaRPr lang="de-DE" noProof="0"/>
           </a:p>
@@ -1853,7 +1853,7 @@
             <a:pPr rtl="0"/>
             <a:fld id="{7431362F-B0A5-4ACD-BFD4-85134C5A716E}" type="datetime1">
               <a:rPr lang="de-DE" noProof="0" smtClean="0"/>
-              <a:t>20.06.2024</a:t>
+              <a:t>21.06.2024</a:t>
             </a:fld>
             <a:endParaRPr lang="de-DE" noProof="0"/>
           </a:p>
@@ -2167,7 +2167,7 @@
             <a:pPr rtl="0"/>
             <a:fld id="{54C69DB9-EB84-4978-9DE4-F43B2245D65B}" type="datetime1">
               <a:rPr lang="de-DE" noProof="0" smtClean="0"/>
-              <a:t>20.06.2024</a:t>
+              <a:t>21.06.2024</a:t>
             </a:fld>
             <a:endParaRPr lang="de-DE" noProof="0"/>
           </a:p>
@@ -2474,7 +2474,7 @@
             <a:pPr rtl="0"/>
             <a:fld id="{3F9DD3BF-D277-40EE-ACAA-A4C3544282B8}" type="datetime1">
               <a:rPr lang="de-DE" noProof="0" smtClean="0"/>
-              <a:t>20.06.2024</a:t>
+              <a:t>21.06.2024</a:t>
             </a:fld>
             <a:endParaRPr lang="de-DE" noProof="0"/>
           </a:p>
@@ -2901,7 +2901,7 @@
             <a:pPr rtl="0"/>
             <a:fld id="{7496D24D-3487-4199-8544-5DCA9BD696CC}" type="datetime1">
               <a:rPr lang="de-DE" noProof="0" smtClean="0"/>
-              <a:t>20.06.2024</a:t>
+              <a:t>21.06.2024</a:t>
             </a:fld>
             <a:endParaRPr lang="de-DE" noProof="0"/>
           </a:p>
@@ -3003,7 +3003,7 @@
             <a:pPr rtl="0"/>
             <a:fld id="{5094BE2D-5ADC-4E1B-B40B-64813051AE22}" type="datetime1">
               <a:rPr lang="de-DE" noProof="0" smtClean="0"/>
-              <a:t>20.06.2024</a:t>
+              <a:t>21.06.2024</a:t>
             </a:fld>
             <a:endParaRPr lang="de-DE" noProof="0"/>
           </a:p>
@@ -3172,7 +3172,7 @@
             <a:pPr rtl="0"/>
             <a:fld id="{13446EC1-A2EB-43A6-A75C-E98048A50F8F}" type="datetime1">
               <a:rPr lang="de-DE" noProof="0" smtClean="0"/>
-              <a:t>20.06.2024</a:t>
+              <a:t>21.06.2024</a:t>
             </a:fld>
             <a:endParaRPr lang="de-DE" noProof="0"/>
           </a:p>
@@ -3556,7 +3556,7 @@
             <a:pPr rtl="0"/>
             <a:fld id="{603C0679-9FBF-4467-928E-FDAFB6BA6CF0}" type="datetime1">
               <a:rPr lang="de-DE" noProof="0" smtClean="0"/>
-              <a:t>20.06.2024</a:t>
+              <a:t>21.06.2024</a:t>
             </a:fld>
             <a:endParaRPr lang="de-DE" noProof="0" dirty="0"/>
           </a:p>
@@ -3852,7 +3852,7 @@
             <a:pPr rtl="0"/>
             <a:fld id="{FBC66ECC-EDE9-40C8-B0A1-A3510CD02E33}" type="datetime1">
               <a:rPr lang="de-DE" noProof="0" smtClean="0"/>
-              <a:t>20.06.2024</a:t>
+              <a:t>21.06.2024</a:t>
             </a:fld>
             <a:endParaRPr lang="de-DE" noProof="0"/>
           </a:p>
@@ -4069,7 +4069,7 @@
             <a:pPr rtl="0"/>
             <a:fld id="{1484DF98-F231-4E87-96B9-E0C13AD9253B}" type="datetime1">
               <a:rPr lang="de-DE" noProof="0" smtClean="0"/>
-              <a:t>20.06.2024</a:t>
+              <a:t>21.06.2024</a:t>
             </a:fld>
             <a:endParaRPr lang="de-DE" noProof="0" dirty="0"/>
           </a:p>
@@ -5146,6 +5146,36 @@
           </a:p>
         </p:txBody>
       </p:sp>
+      <p:pic>
+        <p:nvPicPr>
+          <p:cNvPr id="5" name="Grafik 4" descr="Ein Bild, das Kreis, Schrift, Grafiken, Design enthält.&#10;&#10;Automatisch generierte Beschreibung">
+            <a:extLst>
+              <a:ext uri="{FF2B5EF4-FFF2-40B4-BE49-F238E27FC236}">
+                <a16:creationId xmlns:a16="http://schemas.microsoft.com/office/drawing/2014/main" id="{335FADC9-112C-DACB-360C-FF0776C526EB}"/>
+              </a:ext>
+            </a:extLst>
+          </p:cNvPr>
+          <p:cNvPicPr>
+            <a:picLocks noChangeAspect="1"/>
+          </p:cNvPicPr>
+          <p:nvPr/>
+        </p:nvPicPr>
+        <p:blipFill>
+          <a:blip r:embed="rId4"/>
+          <a:stretch>
+            <a:fillRect/>
+          </a:stretch>
+        </p:blipFill>
+        <p:spPr>
+          <a:xfrm>
+            <a:off x="9893807" y="4571998"/>
+            <a:ext cx="1656426" cy="1656426"/>
+          </a:xfrm>
+          <a:prstGeom prst="rect">
+            <a:avLst/>
+          </a:prstGeom>
+        </p:spPr>
+      </p:pic>
     </p:spTree>
     <p:extLst>
       <p:ext uri="{BB962C8B-B14F-4D97-AF65-F5344CB8AC3E}">
@@ -5290,7 +5320,7 @@
                   <a:spcPts val="600"/>
                 </a:spcAft>
               </a:pPr>
-              <a:t>20.06.2024</a:t>
+              <a:t>21.06.2024</a:t>
             </a:fld>
             <a:endParaRPr lang="de-DE" noProof="0"/>
           </a:p>
@@ -5457,10 +5487,15 @@
             <p:ph idx="1"/>
           </p:nvPr>
         </p:nvSpPr>
-        <p:spPr/>
+        <p:spPr>
+          <a:xfrm>
+            <a:off x="581193" y="2180496"/>
+            <a:ext cx="5514808" cy="3678303"/>
+          </a:xfrm>
+        </p:spPr>
         <p:txBody>
           <a:bodyPr>
-            <a:normAutofit lnSpcReduction="10000"/>
+            <a:normAutofit/>
           </a:bodyPr>
           <a:lstStyle/>
           <a:p>
@@ -5525,29 +5560,8 @@
             </a:r>
           </a:p>
           <a:p>
-            <a:pPr>
-              <a:spcBef>
-                <a:spcPts val="600"/>
-              </a:spcBef>
-            </a:pPr>
-            <a:r>
-              <a:rPr lang="de-DE" dirty="0"/>
-              <a:t>WPF-UI</a:t>
-            </a:r>
-          </a:p>
-          <a:p>
             <a:pPr lvl="1"/>
-            <a:r>
-              <a:rPr lang="de-DE" dirty="0"/>
-              <a:t>Verwendung von UI-Elementen</a:t>
-            </a:r>
-          </a:p>
-          <a:p>
-            <a:pPr lvl="1"/>
-            <a:r>
-              <a:rPr lang="de-DE" dirty="0"/>
-              <a:t>Schlechte Doku / MS-Store App</a:t>
-            </a:r>
+            <a:endParaRPr lang="de-DE" dirty="0"/>
           </a:p>
         </p:txBody>
       </p:sp>
@@ -5575,7 +5589,7 @@
             <a:pPr rtl="0"/>
             <a:fld id="{7431362F-B0A5-4ACD-BFD4-85134C5A716E}" type="datetime1">
               <a:rPr lang="de-DE" noProof="0" smtClean="0"/>
-              <a:t>20.06.2024</a:t>
+              <a:t>21.06.2024</a:t>
             </a:fld>
             <a:endParaRPr lang="de-DE" noProof="0"/>
           </a:p>
@@ -5641,331 +5655,12 @@
           </a:p>
         </p:txBody>
       </p:sp>
-    </p:spTree>
-    <p:extLst>
-      <p:ext uri="{BB962C8B-B14F-4D97-AF65-F5344CB8AC3E}">
-        <p14:creationId xmlns:p14="http://schemas.microsoft.com/office/powerpoint/2010/main" val="2668132914"/>
-      </p:ext>
-    </p:extLst>
-  </p:cSld>
-  <p:clrMapOvr>
-    <a:masterClrMapping/>
-  </p:clrMapOvr>
-</p:sld>
-</file>
-
-<file path=ppt/slides/slide12.xml><?xml version="1.0" encoding="utf-8"?>
-<p:sld xmlns:a="http://schemas.openxmlformats.org/drawingml/2006/main" xmlns:r="http://schemas.openxmlformats.org/officeDocument/2006/relationships" xmlns:p="http://schemas.openxmlformats.org/presentationml/2006/main">
-  <p:cSld>
-    <p:spTree>
-      <p:nvGrpSpPr>
-        <p:cNvPr id="1" name=""/>
-        <p:cNvGrpSpPr/>
-        <p:nvPr/>
-      </p:nvGrpSpPr>
-      <p:grpSpPr>
-        <a:xfrm>
-          <a:off x="0" y="0"/>
-          <a:ext cx="0" cy="0"/>
-          <a:chOff x="0" y="0"/>
-          <a:chExt cx="0" cy="0"/>
-        </a:xfrm>
-      </p:grpSpPr>
-      <p:sp>
-        <p:nvSpPr>
-          <p:cNvPr id="2" name="Titel 1">
-            <a:extLst>
-              <a:ext uri="{FF2B5EF4-FFF2-40B4-BE49-F238E27FC236}">
-                <a16:creationId xmlns:a16="http://schemas.microsoft.com/office/drawing/2014/main" id="{247DF68F-E286-4B45-8CEA-584F8FC6E616}"/>
-              </a:ext>
-            </a:extLst>
-          </p:cNvPr>
-          <p:cNvSpPr>
-            <a:spLocks noGrp="1"/>
-          </p:cNvSpPr>
-          <p:nvPr>
-            <p:ph type="title"/>
-          </p:nvPr>
-        </p:nvSpPr>
-        <p:spPr/>
-        <p:txBody>
-          <a:bodyPr/>
-          <a:lstStyle/>
-          <a:p>
-            <a:r>
-              <a:rPr lang="de-DE" dirty="0"/>
-              <a:t>Quellen</a:t>
-            </a:r>
-            <a:endParaRPr lang="de-AT" dirty="0"/>
-          </a:p>
-        </p:txBody>
-      </p:sp>
-      <p:sp>
-        <p:nvSpPr>
-          <p:cNvPr id="3" name="Inhaltsplatzhalter 2">
-            <a:extLst>
-              <a:ext uri="{FF2B5EF4-FFF2-40B4-BE49-F238E27FC236}">
-                <a16:creationId xmlns:a16="http://schemas.microsoft.com/office/drawing/2014/main" id="{1822FD6B-328B-B2C4-AF8A-521F3BD1762D}"/>
-              </a:ext>
-            </a:extLst>
-          </p:cNvPr>
-          <p:cNvSpPr>
-            <a:spLocks noGrp="1"/>
-          </p:cNvSpPr>
-          <p:nvPr>
-            <p:ph idx="1"/>
-          </p:nvPr>
-        </p:nvSpPr>
-        <p:spPr>
-          <a:xfrm>
-            <a:off x="581193" y="2180496"/>
-            <a:ext cx="5514808" cy="3678303"/>
-          </a:xfrm>
-        </p:spPr>
-        <p:txBody>
-          <a:bodyPr>
-            <a:normAutofit/>
-          </a:bodyPr>
-          <a:lstStyle/>
-          <a:p>
-            <a:pPr marL="0" indent="0">
-              <a:spcAft>
-                <a:spcPts val="0"/>
-              </a:spcAft>
-              <a:buNone/>
-            </a:pPr>
-            <a:r>
-              <a:rPr lang="de-AT" dirty="0">
-                <a:solidFill>
-                  <a:schemeClr val="accent2"/>
-                </a:solidFill>
-              </a:rPr>
-              <a:t>[1] </a:t>
-            </a:r>
-            <a:r>
-              <a:rPr lang="de-AT" dirty="0"/>
-              <a:t>WPF-UI Package GitHub </a:t>
-            </a:r>
-            <a:br>
-              <a:rPr lang="de-AT" dirty="0"/>
-            </a:br>
-            <a:r>
-              <a:rPr lang="de-AT" sz="1600" dirty="0"/>
-              <a:t>(</a:t>
-            </a:r>
-            <a:r>
-              <a:rPr lang="de-AT" sz="1600" dirty="0">
-                <a:hlinkClick r:id="rId2"/>
-              </a:rPr>
-              <a:t>https://github.com/lepoco/wpfui</a:t>
-            </a:r>
-            <a:r>
-              <a:rPr lang="de-AT" sz="1600" dirty="0"/>
-              <a:t>)</a:t>
-            </a:r>
-          </a:p>
-          <a:p>
-            <a:pPr marL="0" indent="0">
-              <a:spcAft>
-                <a:spcPts val="0"/>
-              </a:spcAft>
-              <a:buNone/>
-            </a:pPr>
-            <a:endParaRPr lang="de-AT" sz="1600" dirty="0"/>
-          </a:p>
-          <a:p>
-            <a:pPr marL="0" indent="0">
-              <a:spcAft>
-                <a:spcPts val="0"/>
-              </a:spcAft>
-              <a:buNone/>
-            </a:pPr>
-            <a:r>
-              <a:rPr lang="de-AT" dirty="0">
-                <a:solidFill>
-                  <a:schemeClr val="accent2"/>
-                </a:solidFill>
-              </a:rPr>
-              <a:t>[2] </a:t>
-            </a:r>
-            <a:r>
-              <a:rPr lang="de-AT" dirty="0"/>
-              <a:t>LiveCharts2 (</a:t>
-            </a:r>
-            <a:r>
-              <a:rPr lang="de-AT" dirty="0" err="1"/>
-              <a:t>LiveChartsCore</a:t>
-            </a:r>
-            <a:r>
-              <a:rPr lang="de-AT" dirty="0"/>
-              <a:t>)</a:t>
-            </a:r>
-            <a:br>
-              <a:rPr lang="de-AT" sz="1600" dirty="0"/>
-            </a:br>
-            <a:r>
-              <a:rPr lang="de-AT" sz="1600" dirty="0"/>
-              <a:t>(</a:t>
-            </a:r>
-            <a:r>
-              <a:rPr lang="de-AT" sz="1600" dirty="0">
-                <a:hlinkClick r:id="rId3"/>
-              </a:rPr>
-              <a:t>https://github.com/beto-rodriguez/LiveCharts2</a:t>
-            </a:r>
-            <a:r>
-              <a:rPr lang="de-AT" sz="1600" dirty="0"/>
-              <a:t>)</a:t>
-            </a:r>
-          </a:p>
-          <a:p>
-            <a:pPr marL="0" indent="0">
-              <a:spcAft>
-                <a:spcPts val="0"/>
-              </a:spcAft>
-              <a:buNone/>
-            </a:pPr>
-            <a:endParaRPr lang="de-AT" sz="1600" dirty="0"/>
-          </a:p>
-          <a:p>
-            <a:pPr marL="0" indent="0">
-              <a:spcAft>
-                <a:spcPts val="0"/>
-              </a:spcAft>
-              <a:buNone/>
-            </a:pPr>
-            <a:r>
-              <a:rPr lang="de-AT" dirty="0">
-                <a:solidFill>
-                  <a:schemeClr val="accent2"/>
-                </a:solidFill>
-              </a:rPr>
-              <a:t>[3] </a:t>
-            </a:r>
-            <a:r>
-              <a:rPr lang="de-AT" dirty="0" err="1"/>
-              <a:t>CommunityToolkit.Mvvm</a:t>
-            </a:r>
-            <a:br>
-              <a:rPr lang="de-AT" sz="1600" dirty="0"/>
-            </a:br>
-            <a:r>
-              <a:rPr lang="de-AT" sz="1600" dirty="0"/>
-              <a:t>(</a:t>
-            </a:r>
-            <a:r>
-              <a:rPr lang="de-AT" sz="1600" dirty="0">
-                <a:hlinkClick r:id="rId4"/>
-              </a:rPr>
-              <a:t>https://www.nuget.org/packages/CommunityToolkit.Mvvm</a:t>
-            </a:r>
-            <a:r>
-              <a:rPr lang="de-AT" sz="1600" dirty="0"/>
-              <a:t>)</a:t>
-            </a:r>
-          </a:p>
-        </p:txBody>
-      </p:sp>
-      <p:sp>
-        <p:nvSpPr>
-          <p:cNvPr id="4" name="Datumsplatzhalter 3">
-            <a:extLst>
-              <a:ext uri="{FF2B5EF4-FFF2-40B4-BE49-F238E27FC236}">
-                <a16:creationId xmlns:a16="http://schemas.microsoft.com/office/drawing/2014/main" id="{A87DD601-9796-484E-3DB7-F93AC087FA61}"/>
-              </a:ext>
-            </a:extLst>
-          </p:cNvPr>
-          <p:cNvSpPr>
-            <a:spLocks noGrp="1"/>
-          </p:cNvSpPr>
-          <p:nvPr>
-            <p:ph type="dt" sz="half" idx="10"/>
-          </p:nvPr>
-        </p:nvSpPr>
-        <p:spPr/>
-        <p:txBody>
-          <a:bodyPr/>
-          <a:lstStyle/>
-          <a:p>
-            <a:pPr rtl="0"/>
-            <a:fld id="{7431362F-B0A5-4ACD-BFD4-85134C5A716E}" type="datetime1">
-              <a:rPr lang="de-DE" noProof="0" smtClean="0"/>
-              <a:t>20.06.2024</a:t>
-            </a:fld>
-            <a:endParaRPr lang="de-DE" noProof="0"/>
-          </a:p>
-        </p:txBody>
-      </p:sp>
-      <p:sp>
-        <p:nvSpPr>
-          <p:cNvPr id="5" name="Fußzeilenplatzhalter 4">
-            <a:extLst>
-              <a:ext uri="{FF2B5EF4-FFF2-40B4-BE49-F238E27FC236}">
-                <a16:creationId xmlns:a16="http://schemas.microsoft.com/office/drawing/2014/main" id="{36ACA1D1-6D00-F0F5-6A06-C5B616339D6C}"/>
-              </a:ext>
-            </a:extLst>
-          </p:cNvPr>
-          <p:cNvSpPr>
-            <a:spLocks noGrp="1"/>
-          </p:cNvSpPr>
-          <p:nvPr>
-            <p:ph type="ftr" sz="quarter" idx="11"/>
-          </p:nvPr>
-        </p:nvSpPr>
-        <p:spPr/>
-        <p:txBody>
-          <a:bodyPr/>
-          <a:lstStyle/>
-          <a:p>
-            <a:pPr rtl="0"/>
-            <a:r>
-              <a:rPr lang="de-DE" noProof="0" dirty="0" err="1"/>
-              <a:t>SmartPen</a:t>
-            </a:r>
-            <a:r>
-              <a:rPr lang="de-DE" noProof="0" dirty="0"/>
-              <a:t> UI V2 - (c) David Reinberger</a:t>
-            </a:r>
-          </a:p>
-        </p:txBody>
-      </p:sp>
-      <p:sp>
-        <p:nvSpPr>
-          <p:cNvPr id="6" name="Foliennummernplatzhalter 5">
-            <a:extLst>
-              <a:ext uri="{FF2B5EF4-FFF2-40B4-BE49-F238E27FC236}">
-                <a16:creationId xmlns:a16="http://schemas.microsoft.com/office/drawing/2014/main" id="{4865FA78-C3A3-4FBC-A1D9-87EC236345C9}"/>
-              </a:ext>
-            </a:extLst>
-          </p:cNvPr>
-          <p:cNvSpPr>
-            <a:spLocks noGrp="1"/>
-          </p:cNvSpPr>
-          <p:nvPr>
-            <p:ph type="sldNum" sz="quarter" idx="12"/>
-          </p:nvPr>
-        </p:nvSpPr>
-        <p:spPr/>
-        <p:txBody>
-          <a:bodyPr/>
-          <a:lstStyle/>
-          <a:p>
-            <a:pPr rtl="0"/>
-            <a:fld id="{D57F1E4F-1CFF-5643-939E-217C01CDF565}" type="slidenum">
-              <a:rPr lang="de-DE" noProof="0" smtClean="0"/>
-              <a:pPr rtl="0"/>
-              <a:t>12</a:t>
-            </a:fld>
-            <a:endParaRPr lang="de-DE" noProof="0"/>
-          </a:p>
-        </p:txBody>
-      </p:sp>
       <p:sp>
         <p:nvSpPr>
           <p:cNvPr id="7" name="Inhaltsplatzhalter 2">
             <a:extLst>
               <a:ext uri="{FF2B5EF4-FFF2-40B4-BE49-F238E27FC236}">
-                <a16:creationId xmlns:a16="http://schemas.microsoft.com/office/drawing/2014/main" id="{FC5AE4F5-0D66-0802-11FE-85E64922233E}"/>
+                <a16:creationId xmlns:a16="http://schemas.microsoft.com/office/drawing/2014/main" id="{1C4E4025-2ECF-34FD-413B-A0CC9EC7C78C}"/>
               </a:ext>
             </a:extLst>
           </p:cNvPr>
@@ -5976,8 +5671,8 @@
         </p:nvSpPr>
         <p:spPr>
           <a:xfrm>
-            <a:off x="6096000" y="2180496"/>
-            <a:ext cx="5628794" cy="3678303"/>
+            <a:off x="6095999" y="2178565"/>
+            <a:ext cx="5514808" cy="3678303"/>
           </a:xfrm>
           <a:prstGeom prst="rect">
             <a:avLst/>
@@ -6188,168 +5883,58 @@
             </a:lvl9pPr>
           </a:lstStyle>
           <a:p>
-            <a:pPr marL="0" indent="0">
-              <a:spcAft>
-                <a:spcPts val="0"/>
-              </a:spcAft>
-              <a:buNone/>
+            <a:pPr>
+              <a:spcBef>
+                <a:spcPts val="600"/>
+              </a:spcBef>
             </a:pPr>
             <a:r>
-              <a:rPr lang="de-AT" sz="1800" dirty="0">
-                <a:solidFill>
-                  <a:schemeClr val="accent2"/>
-                </a:solidFill>
-              </a:rPr>
-              <a:t>[4] </a:t>
-            </a:r>
-            <a:r>
-              <a:rPr lang="de-AT" sz="1800" dirty="0">
-                <a:solidFill>
-                  <a:schemeClr val="tx1"/>
-                </a:solidFill>
-              </a:rPr>
-              <a:t>TCP/IP Icon</a:t>
-            </a:r>
-            <a:br>
-              <a:rPr lang="de-AT" sz="1800" dirty="0"/>
-            </a:br>
-            <a:r>
-              <a:rPr lang="de-AT" sz="1600" dirty="0"/>
-              <a:t>(</a:t>
-            </a:r>
-            <a:r>
-              <a:rPr lang="de-AT" sz="1600" dirty="0">
-                <a:hlinkClick r:id="rId5"/>
-              </a:rPr>
-              <a:t>https://www.remoterocketship.com/images/blog/TCP-IP-icon-for-blog.jpg</a:t>
-            </a:r>
-            <a:r>
-              <a:rPr lang="de-AT" sz="1600" dirty="0"/>
-              <a:t>)</a:t>
-            </a:r>
-          </a:p>
-          <a:p>
-            <a:pPr marL="0" indent="0">
-              <a:spcAft>
-                <a:spcPts val="0"/>
-              </a:spcAft>
-              <a:buFont typeface="Wingdings 2" panose="05020102010507070707" pitchFamily="18" charset="2"/>
-              <a:buNone/>
+              <a:rPr lang="de-DE" dirty="0"/>
+              <a:t>WPF-UI</a:t>
+            </a:r>
+          </a:p>
+          <a:p>
+            <a:pPr lvl="1"/>
+            <a:r>
+              <a:rPr lang="de-DE" dirty="0"/>
+              <a:t>Verwendung von UI-Elementen</a:t>
+            </a:r>
+          </a:p>
+          <a:p>
+            <a:pPr lvl="1"/>
+            <a:r>
+              <a:rPr lang="de-DE" dirty="0"/>
+              <a:t>Schlechte Doku / MS-Store App</a:t>
+            </a:r>
+          </a:p>
+          <a:p>
+            <a:pPr>
+              <a:spcBef>
+                <a:spcPts val="600"/>
+              </a:spcBef>
             </a:pPr>
-            <a:endParaRPr lang="de-AT" dirty="0">
-              <a:solidFill>
-                <a:schemeClr val="accent2"/>
-              </a:solidFill>
-            </a:endParaRPr>
-          </a:p>
-          <a:p>
-            <a:pPr marL="0" indent="0">
-              <a:spcAft>
-                <a:spcPts val="0"/>
-              </a:spcAft>
-              <a:buFont typeface="Wingdings 2" panose="05020102010507070707" pitchFamily="18" charset="2"/>
-              <a:buNone/>
-            </a:pPr>
-            <a:r>
-              <a:rPr lang="de-AT" dirty="0">
-                <a:solidFill>
-                  <a:schemeClr val="accent2"/>
-                </a:solidFill>
-              </a:rPr>
-              <a:t>[5] </a:t>
-            </a:r>
-            <a:r>
-              <a:rPr lang="de-AT" dirty="0" err="1"/>
-              <a:t>InfluxDB</a:t>
-            </a:r>
-            <a:r>
-              <a:rPr lang="de-AT" dirty="0"/>
-              <a:t> Icon</a:t>
-            </a:r>
-            <a:br>
-              <a:rPr lang="de-AT" dirty="0"/>
-            </a:br>
-            <a:r>
-              <a:rPr lang="de-AT" sz="1600" dirty="0"/>
-              <a:t>(</a:t>
-            </a:r>
-            <a:r>
-              <a:rPr lang="de-AT" sz="1600" dirty="0">
-                <a:hlinkClick r:id="rId6"/>
-              </a:rPr>
-              <a:t>https://static-00.iconduck.com/assets.00/influxdb-icon-2017x2048-38lz5101.png</a:t>
-            </a:r>
-            <a:r>
-              <a:rPr lang="de-AT" sz="1600" dirty="0"/>
-              <a:t>)</a:t>
-            </a:r>
-          </a:p>
-          <a:p>
-            <a:pPr marL="0" indent="0">
-              <a:spcAft>
-                <a:spcPts val="0"/>
-              </a:spcAft>
-              <a:buFont typeface="Wingdings 2" panose="05020102010507070707" pitchFamily="18" charset="2"/>
-              <a:buNone/>
-            </a:pPr>
-            <a:endParaRPr lang="de-AT" sz="1600" dirty="0"/>
-          </a:p>
-          <a:p>
-            <a:pPr marL="0" indent="0">
-              <a:spcAft>
-                <a:spcPts val="0"/>
-              </a:spcAft>
-              <a:buFont typeface="Wingdings 2" panose="05020102010507070707" pitchFamily="18" charset="2"/>
-              <a:buNone/>
-            </a:pPr>
-            <a:r>
-              <a:rPr lang="de-AT" dirty="0">
-                <a:solidFill>
-                  <a:schemeClr val="accent2"/>
-                </a:solidFill>
-              </a:rPr>
-              <a:t>[6] </a:t>
-            </a:r>
-            <a:r>
-              <a:rPr lang="de-AT" dirty="0">
-                <a:solidFill>
-                  <a:schemeClr val="tx1"/>
-                </a:solidFill>
-              </a:rPr>
-              <a:t>Snackbar Icon</a:t>
-            </a:r>
-            <a:r>
-              <a:rPr lang="de-AT" dirty="0">
-                <a:solidFill>
-                  <a:schemeClr val="accent2"/>
-                </a:solidFill>
-              </a:rPr>
-              <a:t> </a:t>
-            </a:r>
-            <a:br>
-              <a:rPr lang="de-AT" sz="1600" dirty="0"/>
-            </a:br>
-            <a:r>
-              <a:rPr lang="de-AT" sz="1600" dirty="0"/>
-              <a:t>(</a:t>
-            </a:r>
-            <a:r>
-              <a:rPr lang="de-AT" sz="1600" dirty="0">
-                <a:hlinkClick r:id="rId7"/>
-              </a:rPr>
-              <a:t>https://cdn-icons-png.freepik.com/512/1576/1576618.png</a:t>
-            </a:r>
-            <a:r>
-              <a:rPr lang="de-AT" sz="1600" dirty="0"/>
-              <a:t>)</a:t>
-            </a:r>
+            <a:r>
+              <a:rPr lang="de-DE" dirty="0"/>
+              <a:t>TCP-Client Implementierung</a:t>
+            </a:r>
+          </a:p>
+          <a:p>
+            <a:pPr lvl="1"/>
+            <a:r>
+              <a:rPr lang="de-DE" dirty="0"/>
+              <a:t>Asynchronität</a:t>
+            </a:r>
+          </a:p>
+          <a:p>
+            <a:pPr lvl="1"/>
+            <a:endParaRPr lang="de-DE" dirty="0"/>
           </a:p>
         </p:txBody>
       </p:sp>
     </p:spTree>
     <p:extLst>
       <p:ext uri="{BB962C8B-B14F-4D97-AF65-F5344CB8AC3E}">
-        <p14:creationId xmlns:p14="http://schemas.microsoft.com/office/powerpoint/2010/main" val="2051475348"/>
+        <p14:creationId xmlns:p14="http://schemas.microsoft.com/office/powerpoint/2010/main" val="2668132914"/>
       </p:ext>
     </p:extLst>
   </p:cSld>
@@ -6359,7 +5944,7 @@
 </p:sld>
 </file>
 
-<file path=ppt/slides/slide2.xml><?xml version="1.0" encoding="utf-8"?>
+<file path=ppt/slides/slide12.xml><?xml version="1.0" encoding="utf-8"?>
 <p:sld xmlns:a="http://schemas.openxmlformats.org/drawingml/2006/main" xmlns:r="http://schemas.openxmlformats.org/officeDocument/2006/relationships" xmlns:p="http://schemas.openxmlformats.org/presentationml/2006/main">
   <p:cSld>
     <p:spTree>
@@ -6381,7 +5966,7 @@
           <p:cNvPr id="2" name="Titel 1">
             <a:extLst>
               <a:ext uri="{FF2B5EF4-FFF2-40B4-BE49-F238E27FC236}">
-                <a16:creationId xmlns:a16="http://schemas.microsoft.com/office/drawing/2014/main" id="{0CA6496A-6FD3-0F8E-8EA1-0D4EF7411918}"/>
+                <a16:creationId xmlns:a16="http://schemas.microsoft.com/office/drawing/2014/main" id="{247DF68F-E286-4B45-8CEA-584F8FC6E616}"/>
               </a:ext>
             </a:extLst>
           </p:cNvPr>
@@ -6399,7 +5984,7 @@
           <a:p>
             <a:r>
               <a:rPr lang="de-DE" dirty="0"/>
-              <a:t>Inhalt</a:t>
+              <a:t>Quellen</a:t>
             </a:r>
             <a:endParaRPr lang="de-AT" dirty="0"/>
           </a:p>
@@ -6410,7 +5995,7 @@
           <p:cNvPr id="3" name="Inhaltsplatzhalter 2">
             <a:extLst>
               <a:ext uri="{FF2B5EF4-FFF2-40B4-BE49-F238E27FC236}">
-                <a16:creationId xmlns:a16="http://schemas.microsoft.com/office/drawing/2014/main" id="{EC03338F-DBD3-E3F9-27B1-AC7CD14DE30A}"/>
+                <a16:creationId xmlns:a16="http://schemas.microsoft.com/office/drawing/2014/main" id="{1822FD6B-328B-B2C4-AF8A-521F3BD1762D}"/>
               </a:ext>
             </a:extLst>
           </p:cNvPr>
@@ -6421,67 +6006,153 @@
             <p:ph idx="1"/>
           </p:nvPr>
         </p:nvSpPr>
-        <p:spPr/>
+        <p:spPr>
+          <a:xfrm>
+            <a:off x="581193" y="2180496"/>
+            <a:ext cx="5514808" cy="3678303"/>
+          </a:xfrm>
+        </p:spPr>
         <p:txBody>
           <a:bodyPr>
             <a:normAutofit/>
           </a:bodyPr>
           <a:lstStyle/>
           <a:p>
-            <a:pPr>
-              <a:lnSpc>
-                <a:spcPct val="200000"/>
-              </a:lnSpc>
+            <a:pPr marL="0" indent="0">
+              <a:spcAft>
+                <a:spcPts val="0"/>
+              </a:spcAft>
+              <a:buNone/>
             </a:pPr>
             <a:r>
-              <a:rPr lang="de-DE" sz="2000" dirty="0"/>
-              <a:t>Aufgabenstellung</a:t>
-            </a:r>
-          </a:p>
-          <a:p>
-            <a:pPr>
-              <a:lnSpc>
-                <a:spcPct val="200000"/>
-              </a:lnSpc>
+              <a:rPr lang="de-AT" dirty="0">
+                <a:solidFill>
+                  <a:schemeClr val="accent2"/>
+                </a:solidFill>
+              </a:rPr>
+              <a:t>[1] </a:t>
+            </a:r>
+            <a:r>
+              <a:rPr lang="de-AT" dirty="0"/>
+              <a:t>WPF-UI Package GitHub </a:t>
+            </a:r>
+            <a:br>
+              <a:rPr lang="de-AT" dirty="0"/>
+            </a:br>
+            <a:r>
+              <a:rPr lang="de-AT" sz="1600" dirty="0"/>
+              <a:t>(</a:t>
+            </a:r>
+            <a:r>
+              <a:rPr lang="de-AT" sz="1600" dirty="0">
+                <a:hlinkClick r:id="rId2"/>
+              </a:rPr>
+              <a:t>https://github.com/lepoco/wpfui</a:t>
+            </a:r>
+            <a:r>
+              <a:rPr lang="de-AT" sz="1600" dirty="0"/>
+              <a:t>)</a:t>
+            </a:r>
+          </a:p>
+          <a:p>
+            <a:pPr marL="0" indent="0">
+              <a:spcAft>
+                <a:spcPts val="0"/>
+              </a:spcAft>
+              <a:buNone/>
             </a:pPr>
-            <a:r>
-              <a:rPr lang="de-DE" sz="2000" dirty="0"/>
-              <a:t>Umsetzung</a:t>
-            </a:r>
-          </a:p>
-          <a:p>
-            <a:pPr>
-              <a:lnSpc>
-                <a:spcPct val="200000"/>
-              </a:lnSpc>
+            <a:endParaRPr lang="de-AT" sz="1600" dirty="0"/>
+          </a:p>
+          <a:p>
+            <a:pPr marL="0" indent="0">
+              <a:spcAft>
+                <a:spcPts val="0"/>
+              </a:spcAft>
+              <a:buNone/>
             </a:pPr>
             <a:r>
-              <a:rPr lang="de-DE" sz="2000" dirty="0"/>
-              <a:t>Live-Demo</a:t>
-            </a:r>
-          </a:p>
-          <a:p>
-            <a:pPr>
-              <a:lnSpc>
-                <a:spcPct val="200000"/>
-              </a:lnSpc>
+              <a:rPr lang="de-AT" dirty="0">
+                <a:solidFill>
+                  <a:schemeClr val="accent2"/>
+                </a:solidFill>
+              </a:rPr>
+              <a:t>[2] </a:t>
+            </a:r>
+            <a:r>
+              <a:rPr lang="de-AT" dirty="0"/>
+              <a:t>LiveCharts2 (</a:t>
+            </a:r>
+            <a:r>
+              <a:rPr lang="de-AT" dirty="0" err="1"/>
+              <a:t>LiveChartsCore</a:t>
+            </a:r>
+            <a:r>
+              <a:rPr lang="de-AT" dirty="0"/>
+              <a:t>)</a:t>
+            </a:r>
+            <a:br>
+              <a:rPr lang="de-AT" sz="1600" dirty="0"/>
+            </a:br>
+            <a:r>
+              <a:rPr lang="de-AT" sz="1600" dirty="0"/>
+              <a:t>(</a:t>
+            </a:r>
+            <a:r>
+              <a:rPr lang="de-AT" sz="1600" dirty="0">
+                <a:hlinkClick r:id="rId3"/>
+              </a:rPr>
+              <a:t>https://github.com/beto-rodriguez/LiveCharts2</a:t>
+            </a:r>
+            <a:r>
+              <a:rPr lang="de-AT" sz="1600" dirty="0"/>
+              <a:t>)</a:t>
+            </a:r>
+          </a:p>
+          <a:p>
+            <a:pPr marL="0" indent="0">
+              <a:spcAft>
+                <a:spcPts val="0"/>
+              </a:spcAft>
+              <a:buNone/>
             </a:pPr>
-            <a:r>
-              <a:rPr lang="de-DE" sz="2000" dirty="0"/>
-              <a:t>Herausforderungen</a:t>
-            </a:r>
-          </a:p>
-          <a:p>
-            <a:pPr>
-              <a:lnSpc>
-                <a:spcPct val="200000"/>
-              </a:lnSpc>
+            <a:endParaRPr lang="de-AT" sz="1600" dirty="0"/>
+          </a:p>
+          <a:p>
+            <a:pPr marL="0" indent="0">
+              <a:spcAft>
+                <a:spcPts val="0"/>
+              </a:spcAft>
+              <a:buNone/>
             </a:pPr>
             <a:r>
-              <a:rPr lang="de-DE" sz="2000" dirty="0"/>
-              <a:t>Quellen</a:t>
-            </a:r>
-            <a:endParaRPr lang="de-AT" sz="2000" dirty="0"/>
+              <a:rPr lang="de-AT" dirty="0">
+                <a:solidFill>
+                  <a:schemeClr val="accent2"/>
+                </a:solidFill>
+              </a:rPr>
+              <a:t>[3] </a:t>
+            </a:r>
+            <a:r>
+              <a:rPr lang="de-AT" dirty="0" err="1"/>
+              <a:t>CommunityToolkit.Mvvm</a:t>
+            </a:r>
+            <a:br>
+              <a:rPr lang="de-AT" sz="1600" dirty="0"/>
+            </a:br>
+            <a:r>
+              <a:rPr lang="de-AT" sz="1600" dirty="0"/>
+              <a:t>(</a:t>
+            </a:r>
+            <a:r>
+              <a:rPr lang="de-AT" sz="1600" dirty="0">
+                <a:hlinkClick r:id="rId4"/>
+              </a:rPr>
+              <a:t>https://www.nuget.org/packages/CommunityToolkit.Mvvm</a:t>
+            </a:r>
+            <a:r>
+              <a:rPr lang="de-AT" sz="1600" dirty="0"/>
+              <a:t>)</a:t>
+            </a:r>
           </a:p>
         </p:txBody>
       </p:sp>
@@ -6490,7 +6161,7 @@
           <p:cNvPr id="4" name="Datumsplatzhalter 3">
             <a:extLst>
               <a:ext uri="{FF2B5EF4-FFF2-40B4-BE49-F238E27FC236}">
-                <a16:creationId xmlns:a16="http://schemas.microsoft.com/office/drawing/2014/main" id="{2B643092-03C5-9ACB-4745-F3D4AB9B9EFC}"/>
+                <a16:creationId xmlns:a16="http://schemas.microsoft.com/office/drawing/2014/main" id="{A87DD601-9796-484E-3DB7-F93AC087FA61}"/>
               </a:ext>
             </a:extLst>
           </p:cNvPr>
@@ -6507,9 +6178,9 @@
           <a:lstStyle/>
           <a:p>
             <a:pPr rtl="0"/>
-            <a:fld id="{E4D356A5-356B-4A58-A9A8-BB787DF4482C}" type="datetime1">
+            <a:fld id="{7431362F-B0A5-4ACD-BFD4-85134C5A716E}" type="datetime1">
               <a:rPr lang="de-DE" noProof="0" smtClean="0"/>
-              <a:t>20.06.2024</a:t>
+              <a:t>21.06.2024</a:t>
             </a:fld>
             <a:endParaRPr lang="de-DE" noProof="0"/>
           </a:p>
@@ -6520,7 +6191,7 @@
           <p:cNvPr id="5" name="Fußzeilenplatzhalter 4">
             <a:extLst>
               <a:ext uri="{FF2B5EF4-FFF2-40B4-BE49-F238E27FC236}">
-                <a16:creationId xmlns:a16="http://schemas.microsoft.com/office/drawing/2014/main" id="{4C9918DF-89D4-88BF-B4B8-A51983D5B5DE}"/>
+                <a16:creationId xmlns:a16="http://schemas.microsoft.com/office/drawing/2014/main" id="{36ACA1D1-6D00-F0F5-6A06-C5B616339D6C}"/>
               </a:ext>
             </a:extLst>
           </p:cNvPr>
@@ -6538,8 +6209,12 @@
           <a:p>
             <a:pPr rtl="0"/>
             <a:r>
-              <a:rPr lang="de-DE" noProof="0"/>
-              <a:t>SmartPen UI V2 - (c) David Reinberger</a:t>
+              <a:rPr lang="de-DE" noProof="0" dirty="0" err="1"/>
+              <a:t>SmartPen</a:t>
+            </a:r>
+            <a:r>
+              <a:rPr lang="de-DE" noProof="0" dirty="0"/>
+              <a:t> UI V2 - (c) David Reinberger</a:t>
             </a:r>
           </a:p>
         </p:txBody>
@@ -6549,7 +6224,7 @@
           <p:cNvPr id="6" name="Foliennummernplatzhalter 5">
             <a:extLst>
               <a:ext uri="{FF2B5EF4-FFF2-40B4-BE49-F238E27FC236}">
-                <a16:creationId xmlns:a16="http://schemas.microsoft.com/office/drawing/2014/main" id="{C83947C0-C11B-F761-1762-4347740C89F1}"/>
+                <a16:creationId xmlns:a16="http://schemas.microsoft.com/office/drawing/2014/main" id="{4865FA78-C3A3-4FBC-A1D9-87EC236345C9}"/>
               </a:ext>
             </a:extLst>
           </p:cNvPr>
@@ -6569,1136 +6244,7 @@
             <a:fld id="{D57F1E4F-1CFF-5643-939E-217C01CDF565}" type="slidenum">
               <a:rPr lang="de-DE" noProof="0" smtClean="0"/>
               <a:pPr rtl="0"/>
-              <a:t>2</a:t>
-            </a:fld>
-            <a:endParaRPr lang="de-DE" noProof="0"/>
-          </a:p>
-        </p:txBody>
-      </p:sp>
-    </p:spTree>
-    <p:extLst>
-      <p:ext uri="{BB962C8B-B14F-4D97-AF65-F5344CB8AC3E}">
-        <p14:creationId xmlns:p14="http://schemas.microsoft.com/office/powerpoint/2010/main" val="1577633964"/>
-      </p:ext>
-    </p:extLst>
-  </p:cSld>
-  <p:clrMapOvr>
-    <a:masterClrMapping/>
-  </p:clrMapOvr>
-</p:sld>
-</file>
-
-<file path=ppt/slides/slide3.xml><?xml version="1.0" encoding="utf-8"?>
-<p:sld xmlns:a="http://schemas.openxmlformats.org/drawingml/2006/main" xmlns:r="http://schemas.openxmlformats.org/officeDocument/2006/relationships" xmlns:p="http://schemas.openxmlformats.org/presentationml/2006/main">
-  <p:cSld>
-    <p:spTree>
-      <p:nvGrpSpPr>
-        <p:cNvPr id="1" name=""/>
-        <p:cNvGrpSpPr/>
-        <p:nvPr/>
-      </p:nvGrpSpPr>
-      <p:grpSpPr>
-        <a:xfrm>
-          <a:off x="0" y="0"/>
-          <a:ext cx="0" cy="0"/>
-          <a:chOff x="0" y="0"/>
-          <a:chExt cx="0" cy="0"/>
-        </a:xfrm>
-      </p:grpSpPr>
-      <p:sp>
-        <p:nvSpPr>
-          <p:cNvPr id="2" name="Titel 1">
-            <a:extLst>
-              <a:ext uri="{FF2B5EF4-FFF2-40B4-BE49-F238E27FC236}">
-                <a16:creationId xmlns:a16="http://schemas.microsoft.com/office/drawing/2014/main" id="{B1E31102-F17A-949B-D23A-B856BBE03B70}"/>
-              </a:ext>
-            </a:extLst>
-          </p:cNvPr>
-          <p:cNvSpPr>
-            <a:spLocks noGrp="1"/>
-          </p:cNvSpPr>
-          <p:nvPr>
-            <p:ph type="title"/>
-          </p:nvPr>
-        </p:nvSpPr>
-        <p:spPr/>
-        <p:txBody>
-          <a:bodyPr/>
-          <a:lstStyle/>
-          <a:p>
-            <a:r>
-              <a:rPr lang="de-DE" dirty="0"/>
-              <a:t>Aufgabenstellung</a:t>
-            </a:r>
-            <a:endParaRPr lang="de-AT" dirty="0"/>
-          </a:p>
-        </p:txBody>
-      </p:sp>
-      <p:sp>
-        <p:nvSpPr>
-          <p:cNvPr id="3" name="Inhaltsplatzhalter 2">
-            <a:extLst>
-              <a:ext uri="{FF2B5EF4-FFF2-40B4-BE49-F238E27FC236}">
-                <a16:creationId xmlns:a16="http://schemas.microsoft.com/office/drawing/2014/main" id="{9B8CCA2D-C4E8-A6C9-6890-D392B53F9A2C}"/>
-              </a:ext>
-            </a:extLst>
-          </p:cNvPr>
-          <p:cNvSpPr>
-            <a:spLocks noGrp="1"/>
-          </p:cNvSpPr>
-          <p:nvPr>
-            <p:ph idx="1"/>
-          </p:nvPr>
-        </p:nvSpPr>
-        <p:spPr>
-          <a:xfrm>
-            <a:off x="581192" y="2180496"/>
-            <a:ext cx="5514807" cy="3678303"/>
-          </a:xfrm>
-        </p:spPr>
-        <p:txBody>
-          <a:bodyPr/>
-          <a:lstStyle/>
-          <a:p>
-            <a:r>
-              <a:rPr lang="de-DE" dirty="0"/>
-              <a:t>Neue Version der </a:t>
-            </a:r>
-            <a:r>
-              <a:rPr lang="de-DE" dirty="0" err="1"/>
-              <a:t>SmartPen</a:t>
-            </a:r>
-            <a:r>
-              <a:rPr lang="de-DE" dirty="0"/>
-              <a:t> GUI</a:t>
-            </a:r>
-          </a:p>
-          <a:p>
-            <a:pPr lvl="1"/>
-            <a:r>
-              <a:rPr lang="de-DE" dirty="0"/>
-              <a:t>Aufteilen der Funktionalität</a:t>
-            </a:r>
-          </a:p>
-          <a:p>
-            <a:pPr lvl="1"/>
-            <a:r>
-              <a:rPr lang="de-DE" dirty="0"/>
-              <a:t>Mehrere Pages</a:t>
-            </a:r>
-          </a:p>
-          <a:p>
-            <a:pPr lvl="1"/>
-            <a:endParaRPr lang="de-DE" dirty="0"/>
-          </a:p>
-          <a:p>
-            <a:r>
-              <a:rPr lang="de-AT" dirty="0"/>
-              <a:t>Darstellen der Sensor-Daten in Charts</a:t>
-            </a:r>
-          </a:p>
-          <a:p>
-            <a:pPr lvl="1"/>
-            <a:r>
-              <a:rPr lang="de-AT" dirty="0"/>
-              <a:t>3-Achsen Beschleunigung</a:t>
-            </a:r>
-          </a:p>
-          <a:p>
-            <a:pPr lvl="1"/>
-            <a:r>
-              <a:rPr lang="de-AT" dirty="0"/>
-              <a:t>3-Achsen Winkelgeschwindigkeit</a:t>
-            </a:r>
-          </a:p>
-          <a:p>
-            <a:pPr lvl="1"/>
-            <a:r>
-              <a:rPr lang="de-AT" dirty="0"/>
-              <a:t>Druck</a:t>
-            </a:r>
-          </a:p>
-        </p:txBody>
-      </p:sp>
-      <p:sp>
-        <p:nvSpPr>
-          <p:cNvPr id="4" name="Datumsplatzhalter 3">
-            <a:extLst>
-              <a:ext uri="{FF2B5EF4-FFF2-40B4-BE49-F238E27FC236}">
-                <a16:creationId xmlns:a16="http://schemas.microsoft.com/office/drawing/2014/main" id="{9F9DD0A5-A879-BD11-6B78-749E70258011}"/>
-              </a:ext>
-            </a:extLst>
-          </p:cNvPr>
-          <p:cNvSpPr>
-            <a:spLocks noGrp="1"/>
-          </p:cNvSpPr>
-          <p:nvPr>
-            <p:ph type="dt" sz="half" idx="10"/>
-          </p:nvPr>
-        </p:nvSpPr>
-        <p:spPr/>
-        <p:txBody>
-          <a:bodyPr/>
-          <a:lstStyle/>
-          <a:p>
-            <a:pPr rtl="0"/>
-            <a:fld id="{7431362F-B0A5-4ACD-BFD4-85134C5A716E}" type="datetime1">
-              <a:rPr lang="de-DE" noProof="0" smtClean="0"/>
-              <a:t>20.06.2024</a:t>
-            </a:fld>
-            <a:endParaRPr lang="de-DE" noProof="0"/>
-          </a:p>
-        </p:txBody>
-      </p:sp>
-      <p:sp>
-        <p:nvSpPr>
-          <p:cNvPr id="5" name="Fußzeilenplatzhalter 4">
-            <a:extLst>
-              <a:ext uri="{FF2B5EF4-FFF2-40B4-BE49-F238E27FC236}">
-                <a16:creationId xmlns:a16="http://schemas.microsoft.com/office/drawing/2014/main" id="{D75BEC20-2506-A298-F82C-D7B52D8791AE}"/>
-              </a:ext>
-            </a:extLst>
-          </p:cNvPr>
-          <p:cNvSpPr>
-            <a:spLocks noGrp="1"/>
-          </p:cNvSpPr>
-          <p:nvPr>
-            <p:ph type="ftr" sz="quarter" idx="11"/>
-          </p:nvPr>
-        </p:nvSpPr>
-        <p:spPr/>
-        <p:txBody>
-          <a:bodyPr/>
-          <a:lstStyle/>
-          <a:p>
-            <a:pPr rtl="0"/>
-            <a:r>
-              <a:rPr lang="de-DE" noProof="0" dirty="0" err="1"/>
-              <a:t>SmartPen</a:t>
-            </a:r>
-            <a:r>
-              <a:rPr lang="de-DE" noProof="0" dirty="0"/>
-              <a:t> UI V2 - (c) David Reinberger</a:t>
-            </a:r>
-          </a:p>
-        </p:txBody>
-      </p:sp>
-      <p:sp>
-        <p:nvSpPr>
-          <p:cNvPr id="6" name="Foliennummernplatzhalter 5">
-            <a:extLst>
-              <a:ext uri="{FF2B5EF4-FFF2-40B4-BE49-F238E27FC236}">
-                <a16:creationId xmlns:a16="http://schemas.microsoft.com/office/drawing/2014/main" id="{AB6D9721-13E8-B8FB-6AEC-9137EDF557D9}"/>
-              </a:ext>
-            </a:extLst>
-          </p:cNvPr>
-          <p:cNvSpPr>
-            <a:spLocks noGrp="1"/>
-          </p:cNvSpPr>
-          <p:nvPr>
-            <p:ph type="sldNum" sz="quarter" idx="12"/>
-          </p:nvPr>
-        </p:nvSpPr>
-        <p:spPr/>
-        <p:txBody>
-          <a:bodyPr/>
-          <a:lstStyle/>
-          <a:p>
-            <a:pPr rtl="0"/>
-            <a:fld id="{D57F1E4F-1CFF-5643-939E-217C01CDF565}" type="slidenum">
-              <a:rPr lang="de-DE" noProof="0" smtClean="0"/>
-              <a:pPr rtl="0"/>
-              <a:t>3</a:t>
-            </a:fld>
-            <a:endParaRPr lang="de-DE" noProof="0"/>
-          </a:p>
-        </p:txBody>
-      </p:sp>
-      <p:pic>
-        <p:nvPicPr>
-          <p:cNvPr id="10" name="Grafik 9" descr="Ein Bild, das Text, Screenshot, Software, Display enthält.&#10;&#10;Automatisch generierte Beschreibung">
-            <a:extLst>
-              <a:ext uri="{FF2B5EF4-FFF2-40B4-BE49-F238E27FC236}">
-                <a16:creationId xmlns:a16="http://schemas.microsoft.com/office/drawing/2014/main" id="{26BD19C6-6144-0FF9-3774-C5C7114DB556}"/>
-              </a:ext>
-            </a:extLst>
-          </p:cNvPr>
-          <p:cNvPicPr>
-            <a:picLocks noChangeAspect="1"/>
-          </p:cNvPicPr>
-          <p:nvPr/>
-        </p:nvPicPr>
-        <p:blipFill>
-          <a:blip r:embed="rId3"/>
-          <a:stretch>
-            <a:fillRect/>
-          </a:stretch>
-        </p:blipFill>
-        <p:spPr>
-          <a:xfrm>
-            <a:off x="6441843" y="1875319"/>
-            <a:ext cx="5173017" cy="4076492"/>
-          </a:xfrm>
-          <a:prstGeom prst="rect">
-            <a:avLst/>
-          </a:prstGeom>
-        </p:spPr>
-      </p:pic>
-      <p:pic>
-        <p:nvPicPr>
-          <p:cNvPr id="12" name="Grafik 11" descr="Ein Bild, das Text, Screenshot, Display, Schrift enthält.&#10;&#10;Automatisch generierte Beschreibung">
-            <a:extLst>
-              <a:ext uri="{FF2B5EF4-FFF2-40B4-BE49-F238E27FC236}">
-                <a16:creationId xmlns:a16="http://schemas.microsoft.com/office/drawing/2014/main" id="{EBD73AA0-4CC8-4E38-779A-841500E2B6CA}"/>
-              </a:ext>
-            </a:extLst>
-          </p:cNvPr>
-          <p:cNvPicPr>
-            <a:picLocks noChangeAspect="1"/>
-          </p:cNvPicPr>
-          <p:nvPr/>
-        </p:nvPicPr>
-        <p:blipFill>
-          <a:blip r:embed="rId4"/>
-          <a:stretch>
-            <a:fillRect/>
-          </a:stretch>
-        </p:blipFill>
-        <p:spPr>
-          <a:xfrm>
-            <a:off x="6668553" y="4464304"/>
-            <a:ext cx="1914791" cy="866896"/>
-          </a:xfrm>
-          <a:prstGeom prst="rect">
-            <a:avLst/>
-          </a:prstGeom>
-        </p:spPr>
-      </p:pic>
-      <p:pic>
-        <p:nvPicPr>
-          <p:cNvPr id="14" name="Grafik 13" descr="Ein Bild, das Text, Screenshot, Display, Schrift enthält.&#10;&#10;Automatisch generierte Beschreibung">
-            <a:extLst>
-              <a:ext uri="{FF2B5EF4-FFF2-40B4-BE49-F238E27FC236}">
-                <a16:creationId xmlns:a16="http://schemas.microsoft.com/office/drawing/2014/main" id="{9E01FF5B-44BE-8B4B-35F9-B4960C67B507}"/>
-              </a:ext>
-            </a:extLst>
-          </p:cNvPr>
-          <p:cNvPicPr>
-            <a:picLocks noChangeAspect="1"/>
-          </p:cNvPicPr>
-          <p:nvPr/>
-        </p:nvPicPr>
-        <p:blipFill>
-          <a:blip r:embed="rId5"/>
-          <a:stretch>
-            <a:fillRect/>
-          </a:stretch>
-        </p:blipFill>
-        <p:spPr>
-          <a:xfrm>
-            <a:off x="9225863" y="3713377"/>
-            <a:ext cx="2156534" cy="1906935"/>
-          </a:xfrm>
-          <a:prstGeom prst="rect">
-            <a:avLst/>
-          </a:prstGeom>
-        </p:spPr>
-      </p:pic>
-    </p:spTree>
-    <p:extLst>
-      <p:ext uri="{BB962C8B-B14F-4D97-AF65-F5344CB8AC3E}">
-        <p14:creationId xmlns:p14="http://schemas.microsoft.com/office/powerpoint/2010/main" val="3000832417"/>
-      </p:ext>
-    </p:extLst>
-  </p:cSld>
-  <p:clrMapOvr>
-    <a:masterClrMapping/>
-  </p:clrMapOvr>
-</p:sld>
-</file>
-
-<file path=ppt/slides/slide4.xml><?xml version="1.0" encoding="utf-8"?>
-<p:sld xmlns:a="http://schemas.openxmlformats.org/drawingml/2006/main" xmlns:r="http://schemas.openxmlformats.org/officeDocument/2006/relationships" xmlns:p="http://schemas.openxmlformats.org/presentationml/2006/main">
-  <p:cSld>
-    <p:spTree>
-      <p:nvGrpSpPr>
-        <p:cNvPr id="1" name=""/>
-        <p:cNvGrpSpPr/>
-        <p:nvPr/>
-      </p:nvGrpSpPr>
-      <p:grpSpPr>
-        <a:xfrm>
-          <a:off x="0" y="0"/>
-          <a:ext cx="0" cy="0"/>
-          <a:chOff x="0" y="0"/>
-          <a:chExt cx="0" cy="0"/>
-        </a:xfrm>
-      </p:grpSpPr>
-      <p:sp>
-        <p:nvSpPr>
-          <p:cNvPr id="2" name="Titel 1">
-            <a:extLst>
-              <a:ext uri="{FF2B5EF4-FFF2-40B4-BE49-F238E27FC236}">
-                <a16:creationId xmlns:a16="http://schemas.microsoft.com/office/drawing/2014/main" id="{695B72A1-B8C0-436C-4A84-44AF11BCBB06}"/>
-              </a:ext>
-            </a:extLst>
-          </p:cNvPr>
-          <p:cNvSpPr>
-            <a:spLocks noGrp="1"/>
-          </p:cNvSpPr>
-          <p:nvPr>
-            <p:ph type="title"/>
-          </p:nvPr>
-        </p:nvSpPr>
-        <p:spPr/>
-        <p:txBody>
-          <a:bodyPr/>
-          <a:lstStyle/>
-          <a:p>
-            <a:r>
-              <a:rPr lang="de-DE" dirty="0"/>
-              <a:t>Umsetzung (I) - Gesamtkonzept</a:t>
-            </a:r>
-            <a:endParaRPr lang="de-AT" dirty="0"/>
-          </a:p>
-        </p:txBody>
-      </p:sp>
-      <p:pic>
-        <p:nvPicPr>
-          <p:cNvPr id="8" name="Inhaltsplatzhalter 7" descr="Ein Bild, das Text, Screenshot, Schrift, Zahl enthält.&#10;&#10;Automatisch generierte Beschreibung">
-            <a:extLst>
-              <a:ext uri="{FF2B5EF4-FFF2-40B4-BE49-F238E27FC236}">
-                <a16:creationId xmlns:a16="http://schemas.microsoft.com/office/drawing/2014/main" id="{FE03C215-101E-F921-767F-C8E85C88E909}"/>
-              </a:ext>
-            </a:extLst>
-          </p:cNvPr>
-          <p:cNvPicPr>
-            <a:picLocks noGrp="1" noChangeAspect="1"/>
-          </p:cNvPicPr>
-          <p:nvPr>
-            <p:ph idx="1"/>
-          </p:nvPr>
-        </p:nvPicPr>
-        <p:blipFill rotWithShape="1">
-          <a:blip r:embed="rId2"/>
-          <a:srcRect r="18001"/>
-          <a:stretch/>
-        </p:blipFill>
-        <p:spPr>
-          <a:xfrm>
-            <a:off x="3160060" y="2443352"/>
-            <a:ext cx="5871880" cy="2776738"/>
-          </a:xfrm>
-        </p:spPr>
-      </p:pic>
-      <p:sp>
-        <p:nvSpPr>
-          <p:cNvPr id="4" name="Datumsplatzhalter 3">
-            <a:extLst>
-              <a:ext uri="{FF2B5EF4-FFF2-40B4-BE49-F238E27FC236}">
-                <a16:creationId xmlns:a16="http://schemas.microsoft.com/office/drawing/2014/main" id="{D41464D6-0371-EDB6-6835-2B353E0CF490}"/>
-              </a:ext>
-            </a:extLst>
-          </p:cNvPr>
-          <p:cNvSpPr>
-            <a:spLocks noGrp="1"/>
-          </p:cNvSpPr>
-          <p:nvPr>
-            <p:ph type="dt" sz="half" idx="10"/>
-          </p:nvPr>
-        </p:nvSpPr>
-        <p:spPr/>
-        <p:txBody>
-          <a:bodyPr/>
-          <a:lstStyle/>
-          <a:p>
-            <a:pPr rtl="0"/>
-            <a:fld id="{7431362F-B0A5-4ACD-BFD4-85134C5A716E}" type="datetime1">
-              <a:rPr lang="de-DE" noProof="0" smtClean="0"/>
-              <a:t>20.06.2024</a:t>
-            </a:fld>
-            <a:endParaRPr lang="de-DE" noProof="0"/>
-          </a:p>
-        </p:txBody>
-      </p:sp>
-      <p:sp>
-        <p:nvSpPr>
-          <p:cNvPr id="5" name="Fußzeilenplatzhalter 4">
-            <a:extLst>
-              <a:ext uri="{FF2B5EF4-FFF2-40B4-BE49-F238E27FC236}">
-                <a16:creationId xmlns:a16="http://schemas.microsoft.com/office/drawing/2014/main" id="{5E0E65E7-E1AE-F6F3-7C32-E0D7A5F76E04}"/>
-              </a:ext>
-            </a:extLst>
-          </p:cNvPr>
-          <p:cNvSpPr>
-            <a:spLocks noGrp="1"/>
-          </p:cNvSpPr>
-          <p:nvPr>
-            <p:ph type="ftr" sz="quarter" idx="11"/>
-          </p:nvPr>
-        </p:nvSpPr>
-        <p:spPr/>
-        <p:txBody>
-          <a:bodyPr/>
-          <a:lstStyle/>
-          <a:p>
-            <a:pPr rtl="0"/>
-            <a:r>
-              <a:rPr lang="de-DE" noProof="0"/>
-              <a:t>SmartPen UI V2 - (c) David Reinberger</a:t>
-            </a:r>
-          </a:p>
-        </p:txBody>
-      </p:sp>
-      <p:sp>
-        <p:nvSpPr>
-          <p:cNvPr id="6" name="Foliennummernplatzhalter 5">
-            <a:extLst>
-              <a:ext uri="{FF2B5EF4-FFF2-40B4-BE49-F238E27FC236}">
-                <a16:creationId xmlns:a16="http://schemas.microsoft.com/office/drawing/2014/main" id="{B7807F11-2C9E-4F15-6D86-636D10437CF4}"/>
-              </a:ext>
-            </a:extLst>
-          </p:cNvPr>
-          <p:cNvSpPr>
-            <a:spLocks noGrp="1"/>
-          </p:cNvSpPr>
-          <p:nvPr>
-            <p:ph type="sldNum" sz="quarter" idx="12"/>
-          </p:nvPr>
-        </p:nvSpPr>
-        <p:spPr/>
-        <p:txBody>
-          <a:bodyPr/>
-          <a:lstStyle/>
-          <a:p>
-            <a:pPr rtl="0"/>
-            <a:fld id="{D57F1E4F-1CFF-5643-939E-217C01CDF565}" type="slidenum">
-              <a:rPr lang="de-DE" noProof="0" smtClean="0"/>
-              <a:pPr rtl="0"/>
-              <a:t>4</a:t>
-            </a:fld>
-            <a:endParaRPr lang="de-DE" noProof="0"/>
-          </a:p>
-        </p:txBody>
-      </p:sp>
-    </p:spTree>
-    <p:extLst>
-      <p:ext uri="{BB962C8B-B14F-4D97-AF65-F5344CB8AC3E}">
-        <p14:creationId xmlns:p14="http://schemas.microsoft.com/office/powerpoint/2010/main" val="3383360155"/>
-      </p:ext>
-    </p:extLst>
-  </p:cSld>
-  <p:clrMapOvr>
-    <a:masterClrMapping/>
-  </p:clrMapOvr>
-</p:sld>
-</file>
-
-<file path=ppt/slides/slide5.xml><?xml version="1.0" encoding="utf-8"?>
-<p:sld xmlns:a="http://schemas.openxmlformats.org/drawingml/2006/main" xmlns:r="http://schemas.openxmlformats.org/officeDocument/2006/relationships" xmlns:p="http://schemas.openxmlformats.org/presentationml/2006/main">
-  <p:cSld>
-    <p:spTree>
-      <p:nvGrpSpPr>
-        <p:cNvPr id="1" name=""/>
-        <p:cNvGrpSpPr/>
-        <p:nvPr/>
-      </p:nvGrpSpPr>
-      <p:grpSpPr>
-        <a:xfrm>
-          <a:off x="0" y="0"/>
-          <a:ext cx="0" cy="0"/>
-          <a:chOff x="0" y="0"/>
-          <a:chExt cx="0" cy="0"/>
-        </a:xfrm>
-      </p:grpSpPr>
-      <p:sp>
-        <p:nvSpPr>
-          <p:cNvPr id="2" name="Titel 1">
-            <a:extLst>
-              <a:ext uri="{FF2B5EF4-FFF2-40B4-BE49-F238E27FC236}">
-                <a16:creationId xmlns:a16="http://schemas.microsoft.com/office/drawing/2014/main" id="{3633FE6D-58C8-A51F-B109-87BF3F96DA39}"/>
-              </a:ext>
-            </a:extLst>
-          </p:cNvPr>
-          <p:cNvSpPr>
-            <a:spLocks noGrp="1"/>
-          </p:cNvSpPr>
-          <p:nvPr>
-            <p:ph type="title"/>
-          </p:nvPr>
-        </p:nvSpPr>
-        <p:spPr/>
-        <p:txBody>
-          <a:bodyPr/>
-          <a:lstStyle/>
-          <a:p>
-            <a:r>
-              <a:rPr lang="de-DE" dirty="0"/>
-              <a:t>Umsetzung (II) – Verwendete Packages</a:t>
-            </a:r>
-            <a:endParaRPr lang="de-AT" dirty="0"/>
-          </a:p>
-        </p:txBody>
-      </p:sp>
-      <p:sp>
-        <p:nvSpPr>
-          <p:cNvPr id="3" name="Inhaltsplatzhalter 2">
-            <a:extLst>
-              <a:ext uri="{FF2B5EF4-FFF2-40B4-BE49-F238E27FC236}">
-                <a16:creationId xmlns:a16="http://schemas.microsoft.com/office/drawing/2014/main" id="{89CC7069-1F73-D1DA-D25C-7AAE6A55684B}"/>
-              </a:ext>
-            </a:extLst>
-          </p:cNvPr>
-          <p:cNvSpPr>
-            <a:spLocks noGrp="1"/>
-          </p:cNvSpPr>
-          <p:nvPr>
-            <p:ph idx="1"/>
-          </p:nvPr>
-        </p:nvSpPr>
-        <p:spPr/>
-        <p:txBody>
-          <a:bodyPr>
-            <a:normAutofit lnSpcReduction="10000"/>
-          </a:bodyPr>
-          <a:lstStyle/>
-          <a:p>
-            <a:r>
-              <a:rPr lang="de-AT" b="1" dirty="0"/>
-              <a:t>WPF-UI</a:t>
-            </a:r>
-            <a:r>
-              <a:rPr lang="de-AT" dirty="0"/>
-              <a:t>: GUI-</a:t>
-            </a:r>
-            <a:r>
-              <a:rPr lang="de-AT" dirty="0" err="1"/>
-              <a:t>Theme</a:t>
-            </a:r>
-            <a:r>
-              <a:rPr lang="de-AT" dirty="0"/>
-              <a:t> Package</a:t>
-            </a:r>
-            <a:r>
-              <a:rPr lang="de-AT" baseline="30000" dirty="0"/>
-              <a:t>[1]</a:t>
-            </a:r>
-          </a:p>
-          <a:p>
-            <a:pPr lvl="1"/>
-            <a:r>
-              <a:rPr lang="de-AT" dirty="0"/>
-              <a:t>WPF-</a:t>
-            </a:r>
-            <a:r>
-              <a:rPr lang="de-AT" dirty="0" err="1"/>
-              <a:t>UI.Tray</a:t>
-            </a:r>
-            <a:endParaRPr lang="de-AT" dirty="0"/>
-          </a:p>
-          <a:p>
-            <a:pPr lvl="1"/>
-            <a:endParaRPr lang="de-AT" dirty="0"/>
-          </a:p>
-          <a:p>
-            <a:r>
-              <a:rPr lang="de-AT" b="1" dirty="0"/>
-              <a:t>LiveCharts2 </a:t>
-            </a:r>
-            <a:r>
-              <a:rPr lang="de-AT" dirty="0"/>
-              <a:t>(</a:t>
-            </a:r>
-            <a:r>
-              <a:rPr lang="de-AT" dirty="0" err="1"/>
-              <a:t>LiveChartsCore.SkiaSharpView.WPF</a:t>
-            </a:r>
-            <a:r>
-              <a:rPr lang="de-AT" dirty="0"/>
-              <a:t>)</a:t>
-            </a:r>
-            <a:r>
-              <a:rPr lang="de-AT" baseline="30000" dirty="0"/>
-              <a:t>[2]</a:t>
-            </a:r>
-            <a:r>
-              <a:rPr lang="de-AT" dirty="0"/>
-              <a:t>: </a:t>
-            </a:r>
-          </a:p>
-          <a:p>
-            <a:pPr lvl="1"/>
-            <a:r>
-              <a:rPr lang="de-AT" dirty="0"/>
-              <a:t>Darstellung der Sensordaten</a:t>
-            </a:r>
-          </a:p>
-          <a:p>
-            <a:pPr lvl="1"/>
-            <a:r>
-              <a:rPr lang="de-AT" dirty="0"/>
-              <a:t>Version 2.0.0-rc2 (</a:t>
-            </a:r>
-            <a:r>
-              <a:rPr lang="de-AT" dirty="0" err="1"/>
-              <a:t>prerelease</a:t>
-            </a:r>
-            <a:r>
-              <a:rPr lang="de-AT" dirty="0"/>
-              <a:t>)</a:t>
-            </a:r>
-          </a:p>
-          <a:p>
-            <a:pPr lvl="1"/>
-            <a:r>
-              <a:rPr lang="de-AT" dirty="0" err="1"/>
-              <a:t>SkiaSharp</a:t>
-            </a:r>
-            <a:r>
-              <a:rPr lang="de-AT" dirty="0"/>
-              <a:t> Version 2.88.6!)</a:t>
-            </a:r>
-          </a:p>
-          <a:p>
-            <a:endParaRPr lang="de-AT" b="1" dirty="0"/>
-          </a:p>
-          <a:p>
-            <a:r>
-              <a:rPr lang="de-AT" b="1" dirty="0" err="1"/>
-              <a:t>CommunityToolkit.Mvvm</a:t>
-            </a:r>
-            <a:r>
-              <a:rPr lang="de-AT" b="1" baseline="30000" dirty="0"/>
-              <a:t>[3]</a:t>
-            </a:r>
-          </a:p>
-          <a:p>
-            <a:pPr lvl="1"/>
-            <a:r>
-              <a:rPr lang="de-AT" dirty="0"/>
-              <a:t>Realisierung des </a:t>
-            </a:r>
-            <a:r>
-              <a:rPr lang="de-AT" dirty="0" err="1"/>
-              <a:t>Mvvm</a:t>
-            </a:r>
-            <a:r>
-              <a:rPr lang="de-AT" dirty="0"/>
-              <a:t>-Patterns</a:t>
-            </a:r>
-          </a:p>
-        </p:txBody>
-      </p:sp>
-      <p:sp>
-        <p:nvSpPr>
-          <p:cNvPr id="4" name="Datumsplatzhalter 3">
-            <a:extLst>
-              <a:ext uri="{FF2B5EF4-FFF2-40B4-BE49-F238E27FC236}">
-                <a16:creationId xmlns:a16="http://schemas.microsoft.com/office/drawing/2014/main" id="{077AA3BE-37DB-DF79-B5D9-88AA344042E0}"/>
-              </a:ext>
-            </a:extLst>
-          </p:cNvPr>
-          <p:cNvSpPr>
-            <a:spLocks noGrp="1"/>
-          </p:cNvSpPr>
-          <p:nvPr>
-            <p:ph type="dt" sz="half" idx="10"/>
-          </p:nvPr>
-        </p:nvSpPr>
-        <p:spPr/>
-        <p:txBody>
-          <a:bodyPr/>
-          <a:lstStyle/>
-          <a:p>
-            <a:pPr rtl="0"/>
-            <a:fld id="{7431362F-B0A5-4ACD-BFD4-85134C5A716E}" type="datetime1">
-              <a:rPr lang="de-DE" noProof="0" smtClean="0"/>
-              <a:t>20.06.2024</a:t>
-            </a:fld>
-            <a:endParaRPr lang="de-DE" noProof="0"/>
-          </a:p>
-        </p:txBody>
-      </p:sp>
-      <p:sp>
-        <p:nvSpPr>
-          <p:cNvPr id="5" name="Fußzeilenplatzhalter 4">
-            <a:extLst>
-              <a:ext uri="{FF2B5EF4-FFF2-40B4-BE49-F238E27FC236}">
-                <a16:creationId xmlns:a16="http://schemas.microsoft.com/office/drawing/2014/main" id="{1785127E-A86E-871D-B450-7ACE9BAB05C6}"/>
-              </a:ext>
-            </a:extLst>
-          </p:cNvPr>
-          <p:cNvSpPr>
-            <a:spLocks noGrp="1"/>
-          </p:cNvSpPr>
-          <p:nvPr>
-            <p:ph type="ftr" sz="quarter" idx="11"/>
-          </p:nvPr>
-        </p:nvSpPr>
-        <p:spPr/>
-        <p:txBody>
-          <a:bodyPr/>
-          <a:lstStyle/>
-          <a:p>
-            <a:pPr rtl="0"/>
-            <a:r>
-              <a:rPr lang="de-DE" noProof="0"/>
-              <a:t>SmartPen UI V2 - (c) David Reinberger</a:t>
-            </a:r>
-          </a:p>
-        </p:txBody>
-      </p:sp>
-      <p:sp>
-        <p:nvSpPr>
-          <p:cNvPr id="6" name="Foliennummernplatzhalter 5">
-            <a:extLst>
-              <a:ext uri="{FF2B5EF4-FFF2-40B4-BE49-F238E27FC236}">
-                <a16:creationId xmlns:a16="http://schemas.microsoft.com/office/drawing/2014/main" id="{8916DFB9-7BEF-0E31-50F3-7C1503915C0E}"/>
-              </a:ext>
-            </a:extLst>
-          </p:cNvPr>
-          <p:cNvSpPr>
-            <a:spLocks noGrp="1"/>
-          </p:cNvSpPr>
-          <p:nvPr>
-            <p:ph type="sldNum" sz="quarter" idx="12"/>
-          </p:nvPr>
-        </p:nvSpPr>
-        <p:spPr/>
-        <p:txBody>
-          <a:bodyPr/>
-          <a:lstStyle/>
-          <a:p>
-            <a:pPr rtl="0"/>
-            <a:fld id="{D57F1E4F-1CFF-5643-939E-217C01CDF565}" type="slidenum">
-              <a:rPr lang="de-DE" noProof="0" smtClean="0"/>
-              <a:pPr rtl="0"/>
-              <a:t>5</a:t>
-            </a:fld>
-            <a:endParaRPr lang="de-DE" noProof="0"/>
-          </a:p>
-        </p:txBody>
-      </p:sp>
-      <p:pic>
-        <p:nvPicPr>
-          <p:cNvPr id="1026" name="Picture 2" descr="NuGet Gallery | WPF-UI 3.0.4">
-            <a:extLst>
-              <a:ext uri="{FF2B5EF4-FFF2-40B4-BE49-F238E27FC236}">
-                <a16:creationId xmlns:a16="http://schemas.microsoft.com/office/drawing/2014/main" id="{29A3B3B0-C183-A85D-6B72-050C5591BC03}"/>
-              </a:ext>
-            </a:extLst>
-          </p:cNvPr>
-          <p:cNvPicPr>
-            <a:picLocks noChangeAspect="1" noChangeArrowheads="1"/>
-          </p:cNvPicPr>
-          <p:nvPr/>
-        </p:nvPicPr>
-        <p:blipFill rotWithShape="1">
-          <a:blip r:embed="rId2">
-            <a:extLst>
-              <a:ext uri="{28A0092B-C50C-407E-A947-70E740481C1C}">
-                <a14:useLocalDpi xmlns:a14="http://schemas.microsoft.com/office/drawing/2010/main" val="0"/>
-              </a:ext>
-            </a:extLst>
-          </a:blip>
-          <a:srcRect t="17637" b="18921"/>
-          <a:stretch/>
-        </p:blipFill>
-        <p:spPr bwMode="auto">
-          <a:xfrm>
-            <a:off x="4389120" y="2362200"/>
-            <a:ext cx="684624" cy="434340"/>
-          </a:xfrm>
-          <a:prstGeom prst="rect">
-            <a:avLst/>
-          </a:prstGeom>
-          <a:noFill/>
-          <a:extLst>
-            <a:ext uri="{909E8E84-426E-40DD-AFC4-6F175D3DCCD1}">
-              <a14:hiddenFill xmlns:a14="http://schemas.microsoft.com/office/drawing/2010/main">
-                <a:solidFill>
-                  <a:srgbClr val="FFFFFF"/>
-                </a:solidFill>
-              </a14:hiddenFill>
-            </a:ext>
-          </a:extLst>
-        </p:spPr>
-      </p:pic>
-      <p:pic>
-        <p:nvPicPr>
-          <p:cNvPr id="1028" name="Picture 4" descr="LiveCharts2 Alternatives - .NET Graphics | LibHunt">
-            <a:extLst>
-              <a:ext uri="{FF2B5EF4-FFF2-40B4-BE49-F238E27FC236}">
-                <a16:creationId xmlns:a16="http://schemas.microsoft.com/office/drawing/2014/main" id="{0094859E-8D14-EE4E-DF5E-F485C00894D6}"/>
-              </a:ext>
-            </a:extLst>
-          </p:cNvPr>
-          <p:cNvPicPr>
-            <a:picLocks noChangeAspect="1" noChangeArrowheads="1"/>
-          </p:cNvPicPr>
-          <p:nvPr/>
-        </p:nvPicPr>
-        <p:blipFill>
-          <a:blip r:embed="rId3">
-            <a:extLst>
-              <a:ext uri="{28A0092B-C50C-407E-A947-70E740481C1C}">
-                <a14:useLocalDpi xmlns:a14="http://schemas.microsoft.com/office/drawing/2010/main" val="0"/>
-              </a:ext>
-            </a:extLst>
-          </a:blip>
-          <a:srcRect/>
-          <a:stretch>
-            <a:fillRect/>
-          </a:stretch>
-        </p:blipFill>
-        <p:spPr bwMode="auto">
-          <a:xfrm>
-            <a:off x="6324600" y="3272887"/>
-            <a:ext cx="674273" cy="674273"/>
-          </a:xfrm>
-          <a:prstGeom prst="rect">
-            <a:avLst/>
-          </a:prstGeom>
-          <a:noFill/>
-          <a:extLst>
-            <a:ext uri="{909E8E84-426E-40DD-AFC4-6F175D3DCCD1}">
-              <a14:hiddenFill xmlns:a14="http://schemas.microsoft.com/office/drawing/2010/main">
-                <a:solidFill>
-                  <a:srgbClr val="FFFFFF"/>
-                </a:solidFill>
-              </a14:hiddenFill>
-            </a:ext>
-          </a:extLst>
-        </p:spPr>
-      </p:pic>
-      <p:pic>
-        <p:nvPicPr>
-          <p:cNvPr id="1030" name="Picture 6" descr="NuGet Gallery | CommunityToolkit.Mvvm 8.2.2">
-            <a:extLst>
-              <a:ext uri="{FF2B5EF4-FFF2-40B4-BE49-F238E27FC236}">
-                <a16:creationId xmlns:a16="http://schemas.microsoft.com/office/drawing/2014/main" id="{E173E727-BBF4-BB12-C006-79D72462F658}"/>
-              </a:ext>
-            </a:extLst>
-          </p:cNvPr>
-          <p:cNvPicPr>
-            <a:picLocks noChangeAspect="1" noChangeArrowheads="1"/>
-          </p:cNvPicPr>
-          <p:nvPr/>
-        </p:nvPicPr>
-        <p:blipFill>
-          <a:blip r:embed="rId4">
-            <a:extLst>
-              <a:ext uri="{28A0092B-C50C-407E-A947-70E740481C1C}">
-                <a14:useLocalDpi xmlns:a14="http://schemas.microsoft.com/office/drawing/2010/main" val="0"/>
-              </a:ext>
-            </a:extLst>
-          </a:blip>
-          <a:srcRect/>
-          <a:stretch>
-            <a:fillRect/>
-          </a:stretch>
-        </p:blipFill>
-        <p:spPr bwMode="auto">
-          <a:xfrm>
-            <a:off x="4389120" y="5072763"/>
-            <a:ext cx="684624" cy="684624"/>
-          </a:xfrm>
-          <a:prstGeom prst="rect">
-            <a:avLst/>
-          </a:prstGeom>
-          <a:noFill/>
-          <a:extLst>
-            <a:ext uri="{909E8E84-426E-40DD-AFC4-6F175D3DCCD1}">
-              <a14:hiddenFill xmlns:a14="http://schemas.microsoft.com/office/drawing/2010/main">
-                <a:solidFill>
-                  <a:srgbClr val="FFFFFF"/>
-                </a:solidFill>
-              </a14:hiddenFill>
-            </a:ext>
-          </a:extLst>
-        </p:spPr>
-      </p:pic>
-    </p:spTree>
-    <p:extLst>
-      <p:ext uri="{BB962C8B-B14F-4D97-AF65-F5344CB8AC3E}">
-        <p14:creationId xmlns:p14="http://schemas.microsoft.com/office/powerpoint/2010/main" val="3584202487"/>
-      </p:ext>
-    </p:extLst>
-  </p:cSld>
-  <p:clrMapOvr>
-    <a:masterClrMapping/>
-  </p:clrMapOvr>
-</p:sld>
-</file>
-
-<file path=ppt/slides/slide6.xml><?xml version="1.0" encoding="utf-8"?>
-<p:sld xmlns:a="http://schemas.openxmlformats.org/drawingml/2006/main" xmlns:r="http://schemas.openxmlformats.org/officeDocument/2006/relationships" xmlns:p="http://schemas.openxmlformats.org/presentationml/2006/main">
-  <p:cSld>
-    <p:spTree>
-      <p:nvGrpSpPr>
-        <p:cNvPr id="1" name=""/>
-        <p:cNvGrpSpPr/>
-        <p:nvPr/>
-      </p:nvGrpSpPr>
-      <p:grpSpPr>
-        <a:xfrm>
-          <a:off x="0" y="0"/>
-          <a:ext cx="0" cy="0"/>
-          <a:chOff x="0" y="0"/>
-          <a:chExt cx="0" cy="0"/>
-        </a:xfrm>
-      </p:grpSpPr>
-      <p:sp>
-        <p:nvSpPr>
-          <p:cNvPr id="2" name="Titel 1">
-            <a:extLst>
-              <a:ext uri="{FF2B5EF4-FFF2-40B4-BE49-F238E27FC236}">
-                <a16:creationId xmlns:a16="http://schemas.microsoft.com/office/drawing/2014/main" id="{19A59BDD-9E45-29AE-A09C-3FD05F1AF34C}"/>
-              </a:ext>
-            </a:extLst>
-          </p:cNvPr>
-          <p:cNvSpPr>
-            <a:spLocks noGrp="1"/>
-          </p:cNvSpPr>
-          <p:nvPr>
-            <p:ph type="title"/>
-          </p:nvPr>
-        </p:nvSpPr>
-        <p:spPr/>
-        <p:txBody>
-          <a:bodyPr/>
-          <a:lstStyle/>
-          <a:p>
-            <a:r>
-              <a:rPr lang="de-DE" dirty="0"/>
-              <a:t>Umsetzung (III) – Data </a:t>
-            </a:r>
-            <a:r>
-              <a:rPr lang="de-DE" dirty="0" err="1"/>
-              <a:t>Labeling</a:t>
-            </a:r>
-            <a:r>
-              <a:rPr lang="de-DE" dirty="0"/>
-              <a:t> Page</a:t>
-            </a:r>
-            <a:endParaRPr lang="de-AT" dirty="0"/>
-          </a:p>
-        </p:txBody>
-      </p:sp>
-      <p:pic>
-        <p:nvPicPr>
-          <p:cNvPr id="9" name="Inhaltsplatzhalter 8" descr="Ein Bild, das Text, Screenshot, Software, Display enthält.&#10;&#10;Automatisch generierte Beschreibung">
-            <a:extLst>
-              <a:ext uri="{FF2B5EF4-FFF2-40B4-BE49-F238E27FC236}">
-                <a16:creationId xmlns:a16="http://schemas.microsoft.com/office/drawing/2014/main" id="{E8C106C6-8F22-13D4-1ACD-BDEF5B11084E}"/>
-              </a:ext>
-            </a:extLst>
-          </p:cNvPr>
-          <p:cNvPicPr>
-            <a:picLocks noGrp="1" noChangeAspect="1"/>
-          </p:cNvPicPr>
-          <p:nvPr>
-            <p:ph idx="1"/>
-          </p:nvPr>
-        </p:nvPicPr>
-        <p:blipFill>
-          <a:blip r:embed="rId2"/>
-          <a:stretch>
-            <a:fillRect/>
-          </a:stretch>
-        </p:blipFill>
-        <p:spPr>
-          <a:xfrm>
-            <a:off x="438211" y="1914447"/>
-            <a:ext cx="5123363" cy="4037363"/>
-          </a:xfrm>
-        </p:spPr>
-      </p:pic>
-      <p:sp>
-        <p:nvSpPr>
-          <p:cNvPr id="4" name="Datumsplatzhalter 3">
-            <a:extLst>
-              <a:ext uri="{FF2B5EF4-FFF2-40B4-BE49-F238E27FC236}">
-                <a16:creationId xmlns:a16="http://schemas.microsoft.com/office/drawing/2014/main" id="{8741F230-E482-CAE4-9036-C6A4AC1AA488}"/>
-              </a:ext>
-            </a:extLst>
-          </p:cNvPr>
-          <p:cNvSpPr>
-            <a:spLocks noGrp="1"/>
-          </p:cNvSpPr>
-          <p:nvPr>
-            <p:ph type="dt" sz="half" idx="10"/>
-          </p:nvPr>
-        </p:nvSpPr>
-        <p:spPr/>
-        <p:txBody>
-          <a:bodyPr/>
-          <a:lstStyle/>
-          <a:p>
-            <a:pPr rtl="0"/>
-            <a:fld id="{7431362F-B0A5-4ACD-BFD4-85134C5A716E}" type="datetime1">
-              <a:rPr lang="de-DE" noProof="0" smtClean="0"/>
-              <a:t>20.06.2024</a:t>
-            </a:fld>
-            <a:endParaRPr lang="de-DE" noProof="0"/>
-          </a:p>
-        </p:txBody>
-      </p:sp>
-      <p:sp>
-        <p:nvSpPr>
-          <p:cNvPr id="5" name="Fußzeilenplatzhalter 4">
-            <a:extLst>
-              <a:ext uri="{FF2B5EF4-FFF2-40B4-BE49-F238E27FC236}">
-                <a16:creationId xmlns:a16="http://schemas.microsoft.com/office/drawing/2014/main" id="{0F1CAE1D-8FFA-27F3-8ACD-A2F76A8E77A6}"/>
-              </a:ext>
-            </a:extLst>
-          </p:cNvPr>
-          <p:cNvSpPr>
-            <a:spLocks noGrp="1"/>
-          </p:cNvSpPr>
-          <p:nvPr>
-            <p:ph type="ftr" sz="quarter" idx="11"/>
-          </p:nvPr>
-        </p:nvSpPr>
-        <p:spPr/>
-        <p:txBody>
-          <a:bodyPr/>
-          <a:lstStyle/>
-          <a:p>
-            <a:pPr rtl="0"/>
-            <a:r>
-              <a:rPr lang="de-DE" noProof="0"/>
-              <a:t>SmartPen UI V2 - (c) David Reinberger</a:t>
-            </a:r>
-          </a:p>
-        </p:txBody>
-      </p:sp>
-      <p:sp>
-        <p:nvSpPr>
-          <p:cNvPr id="6" name="Foliennummernplatzhalter 5">
-            <a:extLst>
-              <a:ext uri="{FF2B5EF4-FFF2-40B4-BE49-F238E27FC236}">
-                <a16:creationId xmlns:a16="http://schemas.microsoft.com/office/drawing/2014/main" id="{11E8FA70-39C0-D5B4-6D45-886E1CB1D75F}"/>
-              </a:ext>
-            </a:extLst>
-          </p:cNvPr>
-          <p:cNvSpPr>
-            <a:spLocks noGrp="1"/>
-          </p:cNvSpPr>
-          <p:nvPr>
-            <p:ph type="sldNum" sz="quarter" idx="12"/>
-          </p:nvPr>
-        </p:nvSpPr>
-        <p:spPr/>
-        <p:txBody>
-          <a:bodyPr/>
-          <a:lstStyle/>
-          <a:p>
-            <a:pPr rtl="0"/>
-            <a:fld id="{D57F1E4F-1CFF-5643-939E-217C01CDF565}" type="slidenum">
-              <a:rPr lang="de-DE" noProof="0" smtClean="0"/>
-              <a:pPr rtl="0"/>
-              <a:t>6</a:t>
+              <a:t>12</a:t>
             </a:fld>
             <a:endParaRPr lang="de-DE" noProof="0"/>
           </a:p>
@@ -7709,7 +6255,7 @@
           <p:cNvPr id="7" name="Inhaltsplatzhalter 2">
             <a:extLst>
               <a:ext uri="{FF2B5EF4-FFF2-40B4-BE49-F238E27FC236}">
-                <a16:creationId xmlns:a16="http://schemas.microsoft.com/office/drawing/2014/main" id="{75EFB33A-6F69-6807-E044-2E56C4455800}"/>
+                <a16:creationId xmlns:a16="http://schemas.microsoft.com/office/drawing/2014/main" id="{FC5AE4F5-0D66-0802-11FE-85E64922233E}"/>
               </a:ext>
             </a:extLst>
           </p:cNvPr>
@@ -7721,7 +6267,7 @@
         <p:spPr>
           <a:xfrm>
             <a:off x="6096000" y="2180496"/>
-            <a:ext cx="5514808" cy="3678303"/>
+            <a:ext cx="5628794" cy="3678303"/>
           </a:xfrm>
           <a:prstGeom prst="rect">
             <a:avLst/>
@@ -7932,6 +6478,1767 @@
             </a:lvl9pPr>
           </a:lstStyle>
           <a:p>
+            <a:pPr marL="0" indent="0">
+              <a:spcAft>
+                <a:spcPts val="0"/>
+              </a:spcAft>
+              <a:buNone/>
+            </a:pPr>
+            <a:r>
+              <a:rPr lang="de-AT" sz="1800" dirty="0">
+                <a:solidFill>
+                  <a:schemeClr val="accent2"/>
+                </a:solidFill>
+              </a:rPr>
+              <a:t>[4] </a:t>
+            </a:r>
+            <a:r>
+              <a:rPr lang="de-AT" sz="1800" dirty="0">
+                <a:solidFill>
+                  <a:schemeClr val="tx1"/>
+                </a:solidFill>
+              </a:rPr>
+              <a:t>TCP/IP Icon</a:t>
+            </a:r>
+            <a:br>
+              <a:rPr lang="de-AT" sz="1800" dirty="0"/>
+            </a:br>
+            <a:r>
+              <a:rPr lang="de-AT" sz="1600" dirty="0"/>
+              <a:t>(</a:t>
+            </a:r>
+            <a:r>
+              <a:rPr lang="de-AT" sz="1600" dirty="0">
+                <a:hlinkClick r:id="rId5"/>
+              </a:rPr>
+              <a:t>https://www.remoterocketship.com/images/blog/TCP-IP-icon-for-blog.jpg</a:t>
+            </a:r>
+            <a:r>
+              <a:rPr lang="de-AT" sz="1600" dirty="0"/>
+              <a:t>)</a:t>
+            </a:r>
+          </a:p>
+          <a:p>
+            <a:pPr marL="0" indent="0">
+              <a:spcAft>
+                <a:spcPts val="0"/>
+              </a:spcAft>
+              <a:buFont typeface="Wingdings 2" panose="05020102010507070707" pitchFamily="18" charset="2"/>
+              <a:buNone/>
+            </a:pPr>
+            <a:endParaRPr lang="de-AT" dirty="0">
+              <a:solidFill>
+                <a:schemeClr val="accent2"/>
+              </a:solidFill>
+            </a:endParaRPr>
+          </a:p>
+          <a:p>
+            <a:pPr marL="0" indent="0">
+              <a:spcAft>
+                <a:spcPts val="0"/>
+              </a:spcAft>
+              <a:buFont typeface="Wingdings 2" panose="05020102010507070707" pitchFamily="18" charset="2"/>
+              <a:buNone/>
+            </a:pPr>
+            <a:r>
+              <a:rPr lang="de-AT" dirty="0">
+                <a:solidFill>
+                  <a:schemeClr val="accent2"/>
+                </a:solidFill>
+              </a:rPr>
+              <a:t>[5] </a:t>
+            </a:r>
+            <a:r>
+              <a:rPr lang="de-AT" dirty="0" err="1"/>
+              <a:t>InfluxDB</a:t>
+            </a:r>
+            <a:r>
+              <a:rPr lang="de-AT" dirty="0"/>
+              <a:t> Icon</a:t>
+            </a:r>
+            <a:br>
+              <a:rPr lang="de-AT" dirty="0"/>
+            </a:br>
+            <a:r>
+              <a:rPr lang="de-AT" sz="1600" dirty="0"/>
+              <a:t>(</a:t>
+            </a:r>
+            <a:r>
+              <a:rPr lang="de-AT" sz="1600" dirty="0">
+                <a:hlinkClick r:id="rId6"/>
+              </a:rPr>
+              <a:t>https://static-00.iconduck.com/assets.00/influxdb-icon-2017x2048-38lz5101.png</a:t>
+            </a:r>
+            <a:r>
+              <a:rPr lang="de-AT" sz="1600" dirty="0"/>
+              <a:t>)</a:t>
+            </a:r>
+          </a:p>
+          <a:p>
+            <a:pPr marL="0" indent="0">
+              <a:spcAft>
+                <a:spcPts val="0"/>
+              </a:spcAft>
+              <a:buFont typeface="Wingdings 2" panose="05020102010507070707" pitchFamily="18" charset="2"/>
+              <a:buNone/>
+            </a:pPr>
+            <a:endParaRPr lang="de-AT" sz="1600" dirty="0"/>
+          </a:p>
+          <a:p>
+            <a:pPr marL="0" indent="0">
+              <a:spcAft>
+                <a:spcPts val="0"/>
+              </a:spcAft>
+              <a:buFont typeface="Wingdings 2" panose="05020102010507070707" pitchFamily="18" charset="2"/>
+              <a:buNone/>
+            </a:pPr>
+            <a:r>
+              <a:rPr lang="de-AT" dirty="0">
+                <a:solidFill>
+                  <a:schemeClr val="accent2"/>
+                </a:solidFill>
+              </a:rPr>
+              <a:t>[6] </a:t>
+            </a:r>
+            <a:r>
+              <a:rPr lang="de-AT" dirty="0">
+                <a:solidFill>
+                  <a:schemeClr val="tx1"/>
+                </a:solidFill>
+              </a:rPr>
+              <a:t>Snackbar Icon</a:t>
+            </a:r>
+            <a:r>
+              <a:rPr lang="de-AT" dirty="0">
+                <a:solidFill>
+                  <a:schemeClr val="accent2"/>
+                </a:solidFill>
+              </a:rPr>
+              <a:t> </a:t>
+            </a:r>
+            <a:br>
+              <a:rPr lang="de-AT" sz="1600" dirty="0"/>
+            </a:br>
+            <a:r>
+              <a:rPr lang="de-AT" sz="1600" dirty="0"/>
+              <a:t>(</a:t>
+            </a:r>
+            <a:r>
+              <a:rPr lang="de-AT" sz="1600" dirty="0">
+                <a:hlinkClick r:id="rId7"/>
+              </a:rPr>
+              <a:t>https://cdn-icons-png.freepik.com/512/1576/1576618.png</a:t>
+            </a:r>
+            <a:r>
+              <a:rPr lang="de-AT" sz="1600" dirty="0"/>
+              <a:t>)</a:t>
+            </a:r>
+          </a:p>
+        </p:txBody>
+      </p:sp>
+    </p:spTree>
+    <p:extLst>
+      <p:ext uri="{BB962C8B-B14F-4D97-AF65-F5344CB8AC3E}">
+        <p14:creationId xmlns:p14="http://schemas.microsoft.com/office/powerpoint/2010/main" val="2051475348"/>
+      </p:ext>
+    </p:extLst>
+  </p:cSld>
+  <p:clrMapOvr>
+    <a:masterClrMapping/>
+  </p:clrMapOvr>
+</p:sld>
+</file>
+
+<file path=ppt/slides/slide2.xml><?xml version="1.0" encoding="utf-8"?>
+<p:sld xmlns:a="http://schemas.openxmlformats.org/drawingml/2006/main" xmlns:r="http://schemas.openxmlformats.org/officeDocument/2006/relationships" xmlns:p="http://schemas.openxmlformats.org/presentationml/2006/main" show="0">
+  <p:cSld>
+    <p:spTree>
+      <p:nvGrpSpPr>
+        <p:cNvPr id="1" name=""/>
+        <p:cNvGrpSpPr/>
+        <p:nvPr/>
+      </p:nvGrpSpPr>
+      <p:grpSpPr>
+        <a:xfrm>
+          <a:off x="0" y="0"/>
+          <a:ext cx="0" cy="0"/>
+          <a:chOff x="0" y="0"/>
+          <a:chExt cx="0" cy="0"/>
+        </a:xfrm>
+      </p:grpSpPr>
+      <p:sp>
+        <p:nvSpPr>
+          <p:cNvPr id="2" name="Titel 1">
+            <a:extLst>
+              <a:ext uri="{FF2B5EF4-FFF2-40B4-BE49-F238E27FC236}">
+                <a16:creationId xmlns:a16="http://schemas.microsoft.com/office/drawing/2014/main" id="{0CA6496A-6FD3-0F8E-8EA1-0D4EF7411918}"/>
+              </a:ext>
+            </a:extLst>
+          </p:cNvPr>
+          <p:cNvSpPr>
+            <a:spLocks noGrp="1"/>
+          </p:cNvSpPr>
+          <p:nvPr>
+            <p:ph type="title"/>
+          </p:nvPr>
+        </p:nvSpPr>
+        <p:spPr/>
+        <p:txBody>
+          <a:bodyPr/>
+          <a:lstStyle/>
+          <a:p>
+            <a:r>
+              <a:rPr lang="de-DE" dirty="0"/>
+              <a:t>Inhalt</a:t>
+            </a:r>
+            <a:endParaRPr lang="de-AT" dirty="0"/>
+          </a:p>
+        </p:txBody>
+      </p:sp>
+      <p:sp>
+        <p:nvSpPr>
+          <p:cNvPr id="3" name="Inhaltsplatzhalter 2">
+            <a:extLst>
+              <a:ext uri="{FF2B5EF4-FFF2-40B4-BE49-F238E27FC236}">
+                <a16:creationId xmlns:a16="http://schemas.microsoft.com/office/drawing/2014/main" id="{EC03338F-DBD3-E3F9-27B1-AC7CD14DE30A}"/>
+              </a:ext>
+            </a:extLst>
+          </p:cNvPr>
+          <p:cNvSpPr>
+            <a:spLocks noGrp="1"/>
+          </p:cNvSpPr>
+          <p:nvPr>
+            <p:ph idx="1"/>
+          </p:nvPr>
+        </p:nvSpPr>
+        <p:spPr/>
+        <p:txBody>
+          <a:bodyPr>
+            <a:normAutofit/>
+          </a:bodyPr>
+          <a:lstStyle/>
+          <a:p>
+            <a:pPr>
+              <a:lnSpc>
+                <a:spcPct val="200000"/>
+              </a:lnSpc>
+            </a:pPr>
+            <a:r>
+              <a:rPr lang="de-DE" sz="2000" dirty="0"/>
+              <a:t>Aufgabenstellung</a:t>
+            </a:r>
+          </a:p>
+          <a:p>
+            <a:pPr>
+              <a:lnSpc>
+                <a:spcPct val="200000"/>
+              </a:lnSpc>
+            </a:pPr>
+            <a:r>
+              <a:rPr lang="de-DE" sz="2000" dirty="0"/>
+              <a:t>Umsetzung</a:t>
+            </a:r>
+          </a:p>
+          <a:p>
+            <a:pPr>
+              <a:lnSpc>
+                <a:spcPct val="200000"/>
+              </a:lnSpc>
+            </a:pPr>
+            <a:r>
+              <a:rPr lang="de-DE" sz="2000" dirty="0"/>
+              <a:t>Live-Demo</a:t>
+            </a:r>
+          </a:p>
+          <a:p>
+            <a:pPr>
+              <a:lnSpc>
+                <a:spcPct val="200000"/>
+              </a:lnSpc>
+            </a:pPr>
+            <a:r>
+              <a:rPr lang="de-DE" sz="2000" dirty="0"/>
+              <a:t>Herausforderungen</a:t>
+            </a:r>
+          </a:p>
+          <a:p>
+            <a:pPr>
+              <a:lnSpc>
+                <a:spcPct val="200000"/>
+              </a:lnSpc>
+            </a:pPr>
+            <a:r>
+              <a:rPr lang="de-DE" sz="2000" dirty="0"/>
+              <a:t>Quellen</a:t>
+            </a:r>
+            <a:endParaRPr lang="de-AT" sz="2000" dirty="0"/>
+          </a:p>
+        </p:txBody>
+      </p:sp>
+      <p:sp>
+        <p:nvSpPr>
+          <p:cNvPr id="4" name="Datumsplatzhalter 3">
+            <a:extLst>
+              <a:ext uri="{FF2B5EF4-FFF2-40B4-BE49-F238E27FC236}">
+                <a16:creationId xmlns:a16="http://schemas.microsoft.com/office/drawing/2014/main" id="{2B643092-03C5-9ACB-4745-F3D4AB9B9EFC}"/>
+              </a:ext>
+            </a:extLst>
+          </p:cNvPr>
+          <p:cNvSpPr>
+            <a:spLocks noGrp="1"/>
+          </p:cNvSpPr>
+          <p:nvPr>
+            <p:ph type="dt" sz="half" idx="10"/>
+          </p:nvPr>
+        </p:nvSpPr>
+        <p:spPr/>
+        <p:txBody>
+          <a:bodyPr/>
+          <a:lstStyle/>
+          <a:p>
+            <a:pPr rtl="0"/>
+            <a:fld id="{E4D356A5-356B-4A58-A9A8-BB787DF4482C}" type="datetime1">
+              <a:rPr lang="de-DE" noProof="0" smtClean="0"/>
+              <a:t>21.06.2024</a:t>
+            </a:fld>
+            <a:endParaRPr lang="de-DE" noProof="0"/>
+          </a:p>
+        </p:txBody>
+      </p:sp>
+      <p:sp>
+        <p:nvSpPr>
+          <p:cNvPr id="5" name="Fußzeilenplatzhalter 4">
+            <a:extLst>
+              <a:ext uri="{FF2B5EF4-FFF2-40B4-BE49-F238E27FC236}">
+                <a16:creationId xmlns:a16="http://schemas.microsoft.com/office/drawing/2014/main" id="{4C9918DF-89D4-88BF-B4B8-A51983D5B5DE}"/>
+              </a:ext>
+            </a:extLst>
+          </p:cNvPr>
+          <p:cNvSpPr>
+            <a:spLocks noGrp="1"/>
+          </p:cNvSpPr>
+          <p:nvPr>
+            <p:ph type="ftr" sz="quarter" idx="11"/>
+          </p:nvPr>
+        </p:nvSpPr>
+        <p:spPr/>
+        <p:txBody>
+          <a:bodyPr/>
+          <a:lstStyle/>
+          <a:p>
+            <a:pPr rtl="0"/>
+            <a:r>
+              <a:rPr lang="de-DE" noProof="0"/>
+              <a:t>SmartPen UI V2 - (c) David Reinberger</a:t>
+            </a:r>
+          </a:p>
+        </p:txBody>
+      </p:sp>
+      <p:sp>
+        <p:nvSpPr>
+          <p:cNvPr id="6" name="Foliennummernplatzhalter 5">
+            <a:extLst>
+              <a:ext uri="{FF2B5EF4-FFF2-40B4-BE49-F238E27FC236}">
+                <a16:creationId xmlns:a16="http://schemas.microsoft.com/office/drawing/2014/main" id="{C83947C0-C11B-F761-1762-4347740C89F1}"/>
+              </a:ext>
+            </a:extLst>
+          </p:cNvPr>
+          <p:cNvSpPr>
+            <a:spLocks noGrp="1"/>
+          </p:cNvSpPr>
+          <p:nvPr>
+            <p:ph type="sldNum" sz="quarter" idx="12"/>
+          </p:nvPr>
+        </p:nvSpPr>
+        <p:spPr/>
+        <p:txBody>
+          <a:bodyPr/>
+          <a:lstStyle/>
+          <a:p>
+            <a:pPr rtl="0"/>
+            <a:fld id="{D57F1E4F-1CFF-5643-939E-217C01CDF565}" type="slidenum">
+              <a:rPr lang="de-DE" noProof="0" smtClean="0"/>
+              <a:pPr rtl="0"/>
+              <a:t>2</a:t>
+            </a:fld>
+            <a:endParaRPr lang="de-DE" noProof="0"/>
+          </a:p>
+        </p:txBody>
+      </p:sp>
+    </p:spTree>
+    <p:extLst>
+      <p:ext uri="{BB962C8B-B14F-4D97-AF65-F5344CB8AC3E}">
+        <p14:creationId xmlns:p14="http://schemas.microsoft.com/office/powerpoint/2010/main" val="1577633964"/>
+      </p:ext>
+    </p:extLst>
+  </p:cSld>
+  <p:clrMapOvr>
+    <a:masterClrMapping/>
+  </p:clrMapOvr>
+</p:sld>
+</file>
+
+<file path=ppt/slides/slide3.xml><?xml version="1.0" encoding="utf-8"?>
+<p:sld xmlns:a="http://schemas.openxmlformats.org/drawingml/2006/main" xmlns:r="http://schemas.openxmlformats.org/officeDocument/2006/relationships" xmlns:p="http://schemas.openxmlformats.org/presentationml/2006/main">
+  <p:cSld>
+    <p:spTree>
+      <p:nvGrpSpPr>
+        <p:cNvPr id="1" name=""/>
+        <p:cNvGrpSpPr/>
+        <p:nvPr/>
+      </p:nvGrpSpPr>
+      <p:grpSpPr>
+        <a:xfrm>
+          <a:off x="0" y="0"/>
+          <a:ext cx="0" cy="0"/>
+          <a:chOff x="0" y="0"/>
+          <a:chExt cx="0" cy="0"/>
+        </a:xfrm>
+      </p:grpSpPr>
+      <p:sp>
+        <p:nvSpPr>
+          <p:cNvPr id="2" name="Titel 1">
+            <a:extLst>
+              <a:ext uri="{FF2B5EF4-FFF2-40B4-BE49-F238E27FC236}">
+                <a16:creationId xmlns:a16="http://schemas.microsoft.com/office/drawing/2014/main" id="{B1E31102-F17A-949B-D23A-B856BBE03B70}"/>
+              </a:ext>
+            </a:extLst>
+          </p:cNvPr>
+          <p:cNvSpPr>
+            <a:spLocks noGrp="1"/>
+          </p:cNvSpPr>
+          <p:nvPr>
+            <p:ph type="title"/>
+          </p:nvPr>
+        </p:nvSpPr>
+        <p:spPr/>
+        <p:txBody>
+          <a:bodyPr/>
+          <a:lstStyle/>
+          <a:p>
+            <a:r>
+              <a:rPr lang="de-DE" dirty="0"/>
+              <a:t>Aufgabenstellung</a:t>
+            </a:r>
+            <a:endParaRPr lang="de-AT" dirty="0"/>
+          </a:p>
+        </p:txBody>
+      </p:sp>
+      <p:sp>
+        <p:nvSpPr>
+          <p:cNvPr id="3" name="Inhaltsplatzhalter 2">
+            <a:extLst>
+              <a:ext uri="{FF2B5EF4-FFF2-40B4-BE49-F238E27FC236}">
+                <a16:creationId xmlns:a16="http://schemas.microsoft.com/office/drawing/2014/main" id="{9B8CCA2D-C4E8-A6C9-6890-D392B53F9A2C}"/>
+              </a:ext>
+            </a:extLst>
+          </p:cNvPr>
+          <p:cNvSpPr>
+            <a:spLocks noGrp="1"/>
+          </p:cNvSpPr>
+          <p:nvPr>
+            <p:ph idx="1"/>
+          </p:nvPr>
+        </p:nvSpPr>
+        <p:spPr>
+          <a:xfrm>
+            <a:off x="581192" y="2180496"/>
+            <a:ext cx="5514807" cy="3678303"/>
+          </a:xfrm>
+        </p:spPr>
+        <p:txBody>
+          <a:bodyPr/>
+          <a:lstStyle/>
+          <a:p>
+            <a:r>
+              <a:rPr lang="de-DE" dirty="0"/>
+              <a:t>Neue Version der </a:t>
+            </a:r>
+            <a:r>
+              <a:rPr lang="de-DE" dirty="0" err="1"/>
+              <a:t>SmartPen</a:t>
+            </a:r>
+            <a:r>
+              <a:rPr lang="de-DE" dirty="0"/>
+              <a:t> GUI</a:t>
+            </a:r>
+          </a:p>
+          <a:p>
+            <a:pPr lvl="1"/>
+            <a:r>
+              <a:rPr lang="de-DE" dirty="0"/>
+              <a:t>Aufteilen der Funktionalität</a:t>
+            </a:r>
+          </a:p>
+          <a:p>
+            <a:pPr lvl="1"/>
+            <a:r>
+              <a:rPr lang="de-DE" dirty="0"/>
+              <a:t>Mehrere Pages</a:t>
+            </a:r>
+          </a:p>
+          <a:p>
+            <a:pPr>
+              <a:spcBef>
+                <a:spcPts val="1200"/>
+              </a:spcBef>
+            </a:pPr>
+            <a:r>
+              <a:rPr lang="de-AT" dirty="0"/>
+              <a:t>Darstellen der Sensor-Daten in Charts</a:t>
+            </a:r>
+          </a:p>
+          <a:p>
+            <a:pPr lvl="1"/>
+            <a:r>
+              <a:rPr lang="de-AT" dirty="0"/>
+              <a:t>3-Achsen Beschleunigung</a:t>
+            </a:r>
+          </a:p>
+          <a:p>
+            <a:pPr lvl="1"/>
+            <a:r>
+              <a:rPr lang="de-AT" dirty="0"/>
+              <a:t>3-Achsen Winkelgeschwindigkeit</a:t>
+            </a:r>
+          </a:p>
+          <a:p>
+            <a:pPr lvl="1"/>
+            <a:r>
+              <a:rPr lang="de-AT" dirty="0"/>
+              <a:t>Druck</a:t>
+            </a:r>
+          </a:p>
+          <a:p>
+            <a:pPr>
+              <a:spcBef>
+                <a:spcPts val="1200"/>
+              </a:spcBef>
+            </a:pPr>
+            <a:r>
+              <a:rPr lang="de-AT" dirty="0"/>
+              <a:t>Darstellen der erkannten </a:t>
+            </a:r>
+            <a:r>
+              <a:rPr lang="de-AT" dirty="0" err="1"/>
+              <a:t>Lables</a:t>
+            </a:r>
+            <a:endParaRPr lang="de-AT" dirty="0"/>
+          </a:p>
+        </p:txBody>
+      </p:sp>
+      <p:sp>
+        <p:nvSpPr>
+          <p:cNvPr id="4" name="Datumsplatzhalter 3">
+            <a:extLst>
+              <a:ext uri="{FF2B5EF4-FFF2-40B4-BE49-F238E27FC236}">
+                <a16:creationId xmlns:a16="http://schemas.microsoft.com/office/drawing/2014/main" id="{9F9DD0A5-A879-BD11-6B78-749E70258011}"/>
+              </a:ext>
+            </a:extLst>
+          </p:cNvPr>
+          <p:cNvSpPr>
+            <a:spLocks noGrp="1"/>
+          </p:cNvSpPr>
+          <p:nvPr>
+            <p:ph type="dt" sz="half" idx="10"/>
+          </p:nvPr>
+        </p:nvSpPr>
+        <p:spPr/>
+        <p:txBody>
+          <a:bodyPr/>
+          <a:lstStyle/>
+          <a:p>
+            <a:pPr rtl="0"/>
+            <a:fld id="{7431362F-B0A5-4ACD-BFD4-85134C5A716E}" type="datetime1">
+              <a:rPr lang="de-DE" noProof="0" smtClean="0"/>
+              <a:t>21.06.2024</a:t>
+            </a:fld>
+            <a:endParaRPr lang="de-DE" noProof="0"/>
+          </a:p>
+        </p:txBody>
+      </p:sp>
+      <p:sp>
+        <p:nvSpPr>
+          <p:cNvPr id="5" name="Fußzeilenplatzhalter 4">
+            <a:extLst>
+              <a:ext uri="{FF2B5EF4-FFF2-40B4-BE49-F238E27FC236}">
+                <a16:creationId xmlns:a16="http://schemas.microsoft.com/office/drawing/2014/main" id="{D75BEC20-2506-A298-F82C-D7B52D8791AE}"/>
+              </a:ext>
+            </a:extLst>
+          </p:cNvPr>
+          <p:cNvSpPr>
+            <a:spLocks noGrp="1"/>
+          </p:cNvSpPr>
+          <p:nvPr>
+            <p:ph type="ftr" sz="quarter" idx="11"/>
+          </p:nvPr>
+        </p:nvSpPr>
+        <p:spPr/>
+        <p:txBody>
+          <a:bodyPr/>
+          <a:lstStyle/>
+          <a:p>
+            <a:pPr rtl="0"/>
+            <a:r>
+              <a:rPr lang="de-DE" noProof="0" dirty="0" err="1"/>
+              <a:t>SmartPen</a:t>
+            </a:r>
+            <a:r>
+              <a:rPr lang="de-DE" noProof="0" dirty="0"/>
+              <a:t> UI V2 - (c) David Reinberger</a:t>
+            </a:r>
+          </a:p>
+        </p:txBody>
+      </p:sp>
+      <p:sp>
+        <p:nvSpPr>
+          <p:cNvPr id="6" name="Foliennummernplatzhalter 5">
+            <a:extLst>
+              <a:ext uri="{FF2B5EF4-FFF2-40B4-BE49-F238E27FC236}">
+                <a16:creationId xmlns:a16="http://schemas.microsoft.com/office/drawing/2014/main" id="{AB6D9721-13E8-B8FB-6AEC-9137EDF557D9}"/>
+              </a:ext>
+            </a:extLst>
+          </p:cNvPr>
+          <p:cNvSpPr>
+            <a:spLocks noGrp="1"/>
+          </p:cNvSpPr>
+          <p:nvPr>
+            <p:ph type="sldNum" sz="quarter" idx="12"/>
+          </p:nvPr>
+        </p:nvSpPr>
+        <p:spPr/>
+        <p:txBody>
+          <a:bodyPr/>
+          <a:lstStyle/>
+          <a:p>
+            <a:pPr rtl="0"/>
+            <a:fld id="{D57F1E4F-1CFF-5643-939E-217C01CDF565}" type="slidenum">
+              <a:rPr lang="de-DE" noProof="0" smtClean="0"/>
+              <a:pPr rtl="0"/>
+              <a:t>3</a:t>
+            </a:fld>
+            <a:endParaRPr lang="de-DE" noProof="0"/>
+          </a:p>
+        </p:txBody>
+      </p:sp>
+      <p:pic>
+        <p:nvPicPr>
+          <p:cNvPr id="10" name="Grafik 9" descr="Ein Bild, das Text, Screenshot, Software, Display enthält.&#10;&#10;Automatisch generierte Beschreibung">
+            <a:extLst>
+              <a:ext uri="{FF2B5EF4-FFF2-40B4-BE49-F238E27FC236}">
+                <a16:creationId xmlns:a16="http://schemas.microsoft.com/office/drawing/2014/main" id="{26BD19C6-6144-0FF9-3774-C5C7114DB556}"/>
+              </a:ext>
+            </a:extLst>
+          </p:cNvPr>
+          <p:cNvPicPr>
+            <a:picLocks noChangeAspect="1"/>
+          </p:cNvPicPr>
+          <p:nvPr/>
+        </p:nvPicPr>
+        <p:blipFill>
+          <a:blip r:embed="rId3"/>
+          <a:stretch>
+            <a:fillRect/>
+          </a:stretch>
+        </p:blipFill>
+        <p:spPr>
+          <a:xfrm>
+            <a:off x="6441843" y="1875319"/>
+            <a:ext cx="5173017" cy="4076492"/>
+          </a:xfrm>
+          <a:prstGeom prst="rect">
+            <a:avLst/>
+          </a:prstGeom>
+        </p:spPr>
+      </p:pic>
+      <p:pic>
+        <p:nvPicPr>
+          <p:cNvPr id="12" name="Grafik 11" descr="Ein Bild, das Text, Screenshot, Display, Schrift enthält.&#10;&#10;Automatisch generierte Beschreibung">
+            <a:extLst>
+              <a:ext uri="{FF2B5EF4-FFF2-40B4-BE49-F238E27FC236}">
+                <a16:creationId xmlns:a16="http://schemas.microsoft.com/office/drawing/2014/main" id="{EBD73AA0-4CC8-4E38-779A-841500E2B6CA}"/>
+              </a:ext>
+            </a:extLst>
+          </p:cNvPr>
+          <p:cNvPicPr>
+            <a:picLocks noChangeAspect="1"/>
+          </p:cNvPicPr>
+          <p:nvPr/>
+        </p:nvPicPr>
+        <p:blipFill>
+          <a:blip r:embed="rId4"/>
+          <a:stretch>
+            <a:fillRect/>
+          </a:stretch>
+        </p:blipFill>
+        <p:spPr>
+          <a:xfrm>
+            <a:off x="6668553" y="4464304"/>
+            <a:ext cx="1914791" cy="866896"/>
+          </a:xfrm>
+          <a:prstGeom prst="rect">
+            <a:avLst/>
+          </a:prstGeom>
+        </p:spPr>
+      </p:pic>
+      <p:pic>
+        <p:nvPicPr>
+          <p:cNvPr id="14" name="Grafik 13" descr="Ein Bild, das Text, Screenshot, Display, Schrift enthält.&#10;&#10;Automatisch generierte Beschreibung">
+            <a:extLst>
+              <a:ext uri="{FF2B5EF4-FFF2-40B4-BE49-F238E27FC236}">
+                <a16:creationId xmlns:a16="http://schemas.microsoft.com/office/drawing/2014/main" id="{9E01FF5B-44BE-8B4B-35F9-B4960C67B507}"/>
+              </a:ext>
+            </a:extLst>
+          </p:cNvPr>
+          <p:cNvPicPr>
+            <a:picLocks noChangeAspect="1"/>
+          </p:cNvPicPr>
+          <p:nvPr/>
+        </p:nvPicPr>
+        <p:blipFill>
+          <a:blip r:embed="rId5"/>
+          <a:stretch>
+            <a:fillRect/>
+          </a:stretch>
+        </p:blipFill>
+        <p:spPr>
+          <a:xfrm>
+            <a:off x="9225863" y="3713377"/>
+            <a:ext cx="2156534" cy="1906935"/>
+          </a:xfrm>
+          <a:prstGeom prst="rect">
+            <a:avLst/>
+          </a:prstGeom>
+        </p:spPr>
+      </p:pic>
+    </p:spTree>
+    <p:extLst>
+      <p:ext uri="{BB962C8B-B14F-4D97-AF65-F5344CB8AC3E}">
+        <p14:creationId xmlns:p14="http://schemas.microsoft.com/office/powerpoint/2010/main" val="3000832417"/>
+      </p:ext>
+    </p:extLst>
+  </p:cSld>
+  <p:clrMapOvr>
+    <a:masterClrMapping/>
+  </p:clrMapOvr>
+</p:sld>
+</file>
+
+<file path=ppt/slides/slide4.xml><?xml version="1.0" encoding="utf-8"?>
+<p:sld xmlns:a="http://schemas.openxmlformats.org/drawingml/2006/main" xmlns:r="http://schemas.openxmlformats.org/officeDocument/2006/relationships" xmlns:p="http://schemas.openxmlformats.org/presentationml/2006/main">
+  <p:cSld>
+    <p:spTree>
+      <p:nvGrpSpPr>
+        <p:cNvPr id="1" name=""/>
+        <p:cNvGrpSpPr/>
+        <p:nvPr/>
+      </p:nvGrpSpPr>
+      <p:grpSpPr>
+        <a:xfrm>
+          <a:off x="0" y="0"/>
+          <a:ext cx="0" cy="0"/>
+          <a:chOff x="0" y="0"/>
+          <a:chExt cx="0" cy="0"/>
+        </a:xfrm>
+      </p:grpSpPr>
+      <p:sp>
+        <p:nvSpPr>
+          <p:cNvPr id="2" name="Titel 1">
+            <a:extLst>
+              <a:ext uri="{FF2B5EF4-FFF2-40B4-BE49-F238E27FC236}">
+                <a16:creationId xmlns:a16="http://schemas.microsoft.com/office/drawing/2014/main" id="{695B72A1-B8C0-436C-4A84-44AF11BCBB06}"/>
+              </a:ext>
+            </a:extLst>
+          </p:cNvPr>
+          <p:cNvSpPr>
+            <a:spLocks noGrp="1"/>
+          </p:cNvSpPr>
+          <p:nvPr>
+            <p:ph type="title"/>
+          </p:nvPr>
+        </p:nvSpPr>
+        <p:spPr/>
+        <p:txBody>
+          <a:bodyPr/>
+          <a:lstStyle/>
+          <a:p>
+            <a:r>
+              <a:rPr lang="de-DE" dirty="0"/>
+              <a:t>Umsetzung (I) - Gesamtkonzept</a:t>
+            </a:r>
+            <a:endParaRPr lang="de-AT" dirty="0"/>
+          </a:p>
+        </p:txBody>
+      </p:sp>
+      <p:pic>
+        <p:nvPicPr>
+          <p:cNvPr id="8" name="Inhaltsplatzhalter 7" descr="Ein Bild, das Text, Screenshot, Schrift, Zahl enthält.&#10;&#10;Automatisch generierte Beschreibung">
+            <a:extLst>
+              <a:ext uri="{FF2B5EF4-FFF2-40B4-BE49-F238E27FC236}">
+                <a16:creationId xmlns:a16="http://schemas.microsoft.com/office/drawing/2014/main" id="{FE03C215-101E-F921-767F-C8E85C88E909}"/>
+              </a:ext>
+            </a:extLst>
+          </p:cNvPr>
+          <p:cNvPicPr>
+            <a:picLocks noGrp="1" noChangeAspect="1"/>
+          </p:cNvPicPr>
+          <p:nvPr>
+            <p:ph idx="1"/>
+          </p:nvPr>
+        </p:nvPicPr>
+        <p:blipFill rotWithShape="1">
+          <a:blip r:embed="rId2"/>
+          <a:srcRect r="18001"/>
+          <a:stretch/>
+        </p:blipFill>
+        <p:spPr>
+          <a:xfrm>
+            <a:off x="3160060" y="2443352"/>
+            <a:ext cx="5871880" cy="2776738"/>
+          </a:xfrm>
+        </p:spPr>
+      </p:pic>
+      <p:sp>
+        <p:nvSpPr>
+          <p:cNvPr id="4" name="Datumsplatzhalter 3">
+            <a:extLst>
+              <a:ext uri="{FF2B5EF4-FFF2-40B4-BE49-F238E27FC236}">
+                <a16:creationId xmlns:a16="http://schemas.microsoft.com/office/drawing/2014/main" id="{D41464D6-0371-EDB6-6835-2B353E0CF490}"/>
+              </a:ext>
+            </a:extLst>
+          </p:cNvPr>
+          <p:cNvSpPr>
+            <a:spLocks noGrp="1"/>
+          </p:cNvSpPr>
+          <p:nvPr>
+            <p:ph type="dt" sz="half" idx="10"/>
+          </p:nvPr>
+        </p:nvSpPr>
+        <p:spPr/>
+        <p:txBody>
+          <a:bodyPr/>
+          <a:lstStyle/>
+          <a:p>
+            <a:pPr rtl="0"/>
+            <a:fld id="{7431362F-B0A5-4ACD-BFD4-85134C5A716E}" type="datetime1">
+              <a:rPr lang="de-DE" noProof="0" smtClean="0"/>
+              <a:t>21.06.2024</a:t>
+            </a:fld>
+            <a:endParaRPr lang="de-DE" noProof="0"/>
+          </a:p>
+        </p:txBody>
+      </p:sp>
+      <p:sp>
+        <p:nvSpPr>
+          <p:cNvPr id="5" name="Fußzeilenplatzhalter 4">
+            <a:extLst>
+              <a:ext uri="{FF2B5EF4-FFF2-40B4-BE49-F238E27FC236}">
+                <a16:creationId xmlns:a16="http://schemas.microsoft.com/office/drawing/2014/main" id="{5E0E65E7-E1AE-F6F3-7C32-E0D7A5F76E04}"/>
+              </a:ext>
+            </a:extLst>
+          </p:cNvPr>
+          <p:cNvSpPr>
+            <a:spLocks noGrp="1"/>
+          </p:cNvSpPr>
+          <p:nvPr>
+            <p:ph type="ftr" sz="quarter" idx="11"/>
+          </p:nvPr>
+        </p:nvSpPr>
+        <p:spPr/>
+        <p:txBody>
+          <a:bodyPr/>
+          <a:lstStyle/>
+          <a:p>
+            <a:pPr rtl="0"/>
+            <a:r>
+              <a:rPr lang="de-DE" noProof="0"/>
+              <a:t>SmartPen UI V2 - (c) David Reinberger</a:t>
+            </a:r>
+          </a:p>
+        </p:txBody>
+      </p:sp>
+      <p:sp>
+        <p:nvSpPr>
+          <p:cNvPr id="6" name="Foliennummernplatzhalter 5">
+            <a:extLst>
+              <a:ext uri="{FF2B5EF4-FFF2-40B4-BE49-F238E27FC236}">
+                <a16:creationId xmlns:a16="http://schemas.microsoft.com/office/drawing/2014/main" id="{B7807F11-2C9E-4F15-6D86-636D10437CF4}"/>
+              </a:ext>
+            </a:extLst>
+          </p:cNvPr>
+          <p:cNvSpPr>
+            <a:spLocks noGrp="1"/>
+          </p:cNvSpPr>
+          <p:nvPr>
+            <p:ph type="sldNum" sz="quarter" idx="12"/>
+          </p:nvPr>
+        </p:nvSpPr>
+        <p:spPr/>
+        <p:txBody>
+          <a:bodyPr/>
+          <a:lstStyle/>
+          <a:p>
+            <a:pPr rtl="0"/>
+            <a:fld id="{D57F1E4F-1CFF-5643-939E-217C01CDF565}" type="slidenum">
+              <a:rPr lang="de-DE" noProof="0" smtClean="0"/>
+              <a:pPr rtl="0"/>
+              <a:t>4</a:t>
+            </a:fld>
+            <a:endParaRPr lang="de-DE" noProof="0"/>
+          </a:p>
+        </p:txBody>
+      </p:sp>
+    </p:spTree>
+    <p:extLst>
+      <p:ext uri="{BB962C8B-B14F-4D97-AF65-F5344CB8AC3E}">
+        <p14:creationId xmlns:p14="http://schemas.microsoft.com/office/powerpoint/2010/main" val="3383360155"/>
+      </p:ext>
+    </p:extLst>
+  </p:cSld>
+  <p:clrMapOvr>
+    <a:masterClrMapping/>
+  </p:clrMapOvr>
+</p:sld>
+</file>
+
+<file path=ppt/slides/slide5.xml><?xml version="1.0" encoding="utf-8"?>
+<p:sld xmlns:a="http://schemas.openxmlformats.org/drawingml/2006/main" xmlns:r="http://schemas.openxmlformats.org/officeDocument/2006/relationships" xmlns:p="http://schemas.openxmlformats.org/presentationml/2006/main">
+  <p:cSld>
+    <p:spTree>
+      <p:nvGrpSpPr>
+        <p:cNvPr id="1" name=""/>
+        <p:cNvGrpSpPr/>
+        <p:nvPr/>
+      </p:nvGrpSpPr>
+      <p:grpSpPr>
+        <a:xfrm>
+          <a:off x="0" y="0"/>
+          <a:ext cx="0" cy="0"/>
+          <a:chOff x="0" y="0"/>
+          <a:chExt cx="0" cy="0"/>
+        </a:xfrm>
+      </p:grpSpPr>
+      <p:sp>
+        <p:nvSpPr>
+          <p:cNvPr id="2" name="Titel 1">
+            <a:extLst>
+              <a:ext uri="{FF2B5EF4-FFF2-40B4-BE49-F238E27FC236}">
+                <a16:creationId xmlns:a16="http://schemas.microsoft.com/office/drawing/2014/main" id="{3633FE6D-58C8-A51F-B109-87BF3F96DA39}"/>
+              </a:ext>
+            </a:extLst>
+          </p:cNvPr>
+          <p:cNvSpPr>
+            <a:spLocks noGrp="1"/>
+          </p:cNvSpPr>
+          <p:nvPr>
+            <p:ph type="title"/>
+          </p:nvPr>
+        </p:nvSpPr>
+        <p:spPr/>
+        <p:txBody>
+          <a:bodyPr/>
+          <a:lstStyle/>
+          <a:p>
+            <a:r>
+              <a:rPr lang="de-DE" dirty="0"/>
+              <a:t>Umsetzung (II) – Verwendete Packages</a:t>
+            </a:r>
+            <a:endParaRPr lang="de-AT" dirty="0"/>
+          </a:p>
+        </p:txBody>
+      </p:sp>
+      <p:sp>
+        <p:nvSpPr>
+          <p:cNvPr id="3" name="Inhaltsplatzhalter 2">
+            <a:extLst>
+              <a:ext uri="{FF2B5EF4-FFF2-40B4-BE49-F238E27FC236}">
+                <a16:creationId xmlns:a16="http://schemas.microsoft.com/office/drawing/2014/main" id="{89CC7069-1F73-D1DA-D25C-7AAE6A55684B}"/>
+              </a:ext>
+            </a:extLst>
+          </p:cNvPr>
+          <p:cNvSpPr>
+            <a:spLocks noGrp="1"/>
+          </p:cNvSpPr>
+          <p:nvPr>
+            <p:ph idx="1"/>
+          </p:nvPr>
+        </p:nvSpPr>
+        <p:spPr/>
+        <p:txBody>
+          <a:bodyPr>
+            <a:normAutofit lnSpcReduction="10000"/>
+          </a:bodyPr>
+          <a:lstStyle/>
+          <a:p>
+            <a:r>
+              <a:rPr lang="de-AT" b="1" dirty="0"/>
+              <a:t>WPF-UI</a:t>
+            </a:r>
+            <a:r>
+              <a:rPr lang="de-AT" dirty="0"/>
+              <a:t>: GUI-</a:t>
+            </a:r>
+            <a:r>
+              <a:rPr lang="de-AT" dirty="0" err="1"/>
+              <a:t>Theme</a:t>
+            </a:r>
+            <a:r>
+              <a:rPr lang="de-AT" dirty="0"/>
+              <a:t> Package</a:t>
+            </a:r>
+            <a:r>
+              <a:rPr lang="de-AT" baseline="30000" dirty="0"/>
+              <a:t>[1]</a:t>
+            </a:r>
+          </a:p>
+          <a:p>
+            <a:pPr lvl="1"/>
+            <a:r>
+              <a:rPr lang="de-AT" dirty="0"/>
+              <a:t>WPF-</a:t>
+            </a:r>
+            <a:r>
+              <a:rPr lang="de-AT" dirty="0" err="1"/>
+              <a:t>UI.Tray</a:t>
+            </a:r>
+            <a:endParaRPr lang="de-AT" dirty="0"/>
+          </a:p>
+          <a:p>
+            <a:pPr lvl="1"/>
+            <a:endParaRPr lang="de-AT" dirty="0"/>
+          </a:p>
+          <a:p>
+            <a:r>
+              <a:rPr lang="de-AT" b="1" dirty="0"/>
+              <a:t>LiveCharts2 </a:t>
+            </a:r>
+            <a:r>
+              <a:rPr lang="de-AT" dirty="0"/>
+              <a:t>(</a:t>
+            </a:r>
+            <a:r>
+              <a:rPr lang="de-AT" dirty="0" err="1"/>
+              <a:t>LiveChartsCore.SkiaSharpView.WPF</a:t>
+            </a:r>
+            <a:r>
+              <a:rPr lang="de-AT" dirty="0"/>
+              <a:t>)</a:t>
+            </a:r>
+            <a:r>
+              <a:rPr lang="de-AT" baseline="30000" dirty="0"/>
+              <a:t>[2]</a:t>
+            </a:r>
+            <a:r>
+              <a:rPr lang="de-AT" dirty="0"/>
+              <a:t>: </a:t>
+            </a:r>
+          </a:p>
+          <a:p>
+            <a:pPr lvl="1"/>
+            <a:r>
+              <a:rPr lang="de-AT" dirty="0"/>
+              <a:t>Darstellung der Sensordaten</a:t>
+            </a:r>
+          </a:p>
+          <a:p>
+            <a:pPr lvl="1"/>
+            <a:r>
+              <a:rPr lang="de-AT" dirty="0"/>
+              <a:t>Version 2.0.0-rc2 (</a:t>
+            </a:r>
+            <a:r>
+              <a:rPr lang="de-AT" dirty="0" err="1"/>
+              <a:t>prerelease</a:t>
+            </a:r>
+            <a:r>
+              <a:rPr lang="de-AT" dirty="0"/>
+              <a:t>)</a:t>
+            </a:r>
+          </a:p>
+          <a:p>
+            <a:pPr lvl="1"/>
+            <a:r>
+              <a:rPr lang="de-AT" dirty="0" err="1"/>
+              <a:t>SkiaSharp</a:t>
+            </a:r>
+            <a:r>
+              <a:rPr lang="de-AT" dirty="0"/>
+              <a:t> Version 2.88.6!</a:t>
+            </a:r>
+          </a:p>
+          <a:p>
+            <a:endParaRPr lang="de-AT" b="1" dirty="0"/>
+          </a:p>
+          <a:p>
+            <a:r>
+              <a:rPr lang="de-AT" b="1" dirty="0" err="1"/>
+              <a:t>CommunityToolkit.Mvvm</a:t>
+            </a:r>
+            <a:r>
+              <a:rPr lang="de-AT" b="1" baseline="30000" dirty="0"/>
+              <a:t>[3]</a:t>
+            </a:r>
+          </a:p>
+          <a:p>
+            <a:pPr lvl="1"/>
+            <a:r>
+              <a:rPr lang="de-AT" dirty="0"/>
+              <a:t>Realisierung des </a:t>
+            </a:r>
+            <a:r>
+              <a:rPr lang="de-AT" dirty="0" err="1"/>
+              <a:t>Mvvm</a:t>
+            </a:r>
+            <a:r>
+              <a:rPr lang="de-AT" dirty="0"/>
+              <a:t>-Patterns</a:t>
+            </a:r>
+          </a:p>
+        </p:txBody>
+      </p:sp>
+      <p:sp>
+        <p:nvSpPr>
+          <p:cNvPr id="4" name="Datumsplatzhalter 3">
+            <a:extLst>
+              <a:ext uri="{FF2B5EF4-FFF2-40B4-BE49-F238E27FC236}">
+                <a16:creationId xmlns:a16="http://schemas.microsoft.com/office/drawing/2014/main" id="{077AA3BE-37DB-DF79-B5D9-88AA344042E0}"/>
+              </a:ext>
+            </a:extLst>
+          </p:cNvPr>
+          <p:cNvSpPr>
+            <a:spLocks noGrp="1"/>
+          </p:cNvSpPr>
+          <p:nvPr>
+            <p:ph type="dt" sz="half" idx="10"/>
+          </p:nvPr>
+        </p:nvSpPr>
+        <p:spPr/>
+        <p:txBody>
+          <a:bodyPr/>
+          <a:lstStyle/>
+          <a:p>
+            <a:pPr rtl="0"/>
+            <a:fld id="{7431362F-B0A5-4ACD-BFD4-85134C5A716E}" type="datetime1">
+              <a:rPr lang="de-DE" noProof="0" smtClean="0"/>
+              <a:t>21.06.2024</a:t>
+            </a:fld>
+            <a:endParaRPr lang="de-DE" noProof="0"/>
+          </a:p>
+        </p:txBody>
+      </p:sp>
+      <p:sp>
+        <p:nvSpPr>
+          <p:cNvPr id="5" name="Fußzeilenplatzhalter 4">
+            <a:extLst>
+              <a:ext uri="{FF2B5EF4-FFF2-40B4-BE49-F238E27FC236}">
+                <a16:creationId xmlns:a16="http://schemas.microsoft.com/office/drawing/2014/main" id="{1785127E-A86E-871D-B450-7ACE9BAB05C6}"/>
+              </a:ext>
+            </a:extLst>
+          </p:cNvPr>
+          <p:cNvSpPr>
+            <a:spLocks noGrp="1"/>
+          </p:cNvSpPr>
+          <p:nvPr>
+            <p:ph type="ftr" sz="quarter" idx="11"/>
+          </p:nvPr>
+        </p:nvSpPr>
+        <p:spPr/>
+        <p:txBody>
+          <a:bodyPr/>
+          <a:lstStyle/>
+          <a:p>
+            <a:pPr rtl="0"/>
+            <a:r>
+              <a:rPr lang="de-DE" noProof="0"/>
+              <a:t>SmartPen UI V2 - (c) David Reinberger</a:t>
+            </a:r>
+          </a:p>
+        </p:txBody>
+      </p:sp>
+      <p:sp>
+        <p:nvSpPr>
+          <p:cNvPr id="6" name="Foliennummernplatzhalter 5">
+            <a:extLst>
+              <a:ext uri="{FF2B5EF4-FFF2-40B4-BE49-F238E27FC236}">
+                <a16:creationId xmlns:a16="http://schemas.microsoft.com/office/drawing/2014/main" id="{8916DFB9-7BEF-0E31-50F3-7C1503915C0E}"/>
+              </a:ext>
+            </a:extLst>
+          </p:cNvPr>
+          <p:cNvSpPr>
+            <a:spLocks noGrp="1"/>
+          </p:cNvSpPr>
+          <p:nvPr>
+            <p:ph type="sldNum" sz="quarter" idx="12"/>
+          </p:nvPr>
+        </p:nvSpPr>
+        <p:spPr/>
+        <p:txBody>
+          <a:bodyPr/>
+          <a:lstStyle/>
+          <a:p>
+            <a:pPr rtl="0"/>
+            <a:fld id="{D57F1E4F-1CFF-5643-939E-217C01CDF565}" type="slidenum">
+              <a:rPr lang="de-DE" noProof="0" smtClean="0"/>
+              <a:pPr rtl="0"/>
+              <a:t>5</a:t>
+            </a:fld>
+            <a:endParaRPr lang="de-DE" noProof="0"/>
+          </a:p>
+        </p:txBody>
+      </p:sp>
+      <p:pic>
+        <p:nvPicPr>
+          <p:cNvPr id="1026" name="Picture 2" descr="NuGet Gallery | WPF-UI 3.0.4">
+            <a:extLst>
+              <a:ext uri="{FF2B5EF4-FFF2-40B4-BE49-F238E27FC236}">
+                <a16:creationId xmlns:a16="http://schemas.microsoft.com/office/drawing/2014/main" id="{29A3B3B0-C183-A85D-6B72-050C5591BC03}"/>
+              </a:ext>
+            </a:extLst>
+          </p:cNvPr>
+          <p:cNvPicPr>
+            <a:picLocks noChangeAspect="1" noChangeArrowheads="1"/>
+          </p:cNvPicPr>
+          <p:nvPr/>
+        </p:nvPicPr>
+        <p:blipFill rotWithShape="1">
+          <a:blip r:embed="rId2">
+            <a:extLst>
+              <a:ext uri="{28A0092B-C50C-407E-A947-70E740481C1C}">
+                <a14:useLocalDpi xmlns:a14="http://schemas.microsoft.com/office/drawing/2010/main" val="0"/>
+              </a:ext>
+            </a:extLst>
+          </a:blip>
+          <a:srcRect t="17637" b="18921"/>
+          <a:stretch/>
+        </p:blipFill>
+        <p:spPr bwMode="auto">
+          <a:xfrm>
+            <a:off x="4389120" y="2362200"/>
+            <a:ext cx="684624" cy="434340"/>
+          </a:xfrm>
+          <a:prstGeom prst="rect">
+            <a:avLst/>
+          </a:prstGeom>
+          <a:noFill/>
+          <a:extLst>
+            <a:ext uri="{909E8E84-426E-40DD-AFC4-6F175D3DCCD1}">
+              <a14:hiddenFill xmlns:a14="http://schemas.microsoft.com/office/drawing/2010/main">
+                <a:solidFill>
+                  <a:srgbClr val="FFFFFF"/>
+                </a:solidFill>
+              </a14:hiddenFill>
+            </a:ext>
+          </a:extLst>
+        </p:spPr>
+      </p:pic>
+      <p:pic>
+        <p:nvPicPr>
+          <p:cNvPr id="1028" name="Picture 4" descr="LiveCharts2 Alternatives - .NET Graphics | LibHunt">
+            <a:extLst>
+              <a:ext uri="{FF2B5EF4-FFF2-40B4-BE49-F238E27FC236}">
+                <a16:creationId xmlns:a16="http://schemas.microsoft.com/office/drawing/2014/main" id="{0094859E-8D14-EE4E-DF5E-F485C00894D6}"/>
+              </a:ext>
+            </a:extLst>
+          </p:cNvPr>
+          <p:cNvPicPr>
+            <a:picLocks noChangeAspect="1" noChangeArrowheads="1"/>
+          </p:cNvPicPr>
+          <p:nvPr/>
+        </p:nvPicPr>
+        <p:blipFill>
+          <a:blip r:embed="rId3">
+            <a:extLst>
+              <a:ext uri="{28A0092B-C50C-407E-A947-70E740481C1C}">
+                <a14:useLocalDpi xmlns:a14="http://schemas.microsoft.com/office/drawing/2010/main" val="0"/>
+              </a:ext>
+            </a:extLst>
+          </a:blip>
+          <a:srcRect/>
+          <a:stretch>
+            <a:fillRect/>
+          </a:stretch>
+        </p:blipFill>
+        <p:spPr bwMode="auto">
+          <a:xfrm>
+            <a:off x="6324600" y="3272887"/>
+            <a:ext cx="674273" cy="674273"/>
+          </a:xfrm>
+          <a:prstGeom prst="rect">
+            <a:avLst/>
+          </a:prstGeom>
+          <a:noFill/>
+          <a:extLst>
+            <a:ext uri="{909E8E84-426E-40DD-AFC4-6F175D3DCCD1}">
+              <a14:hiddenFill xmlns:a14="http://schemas.microsoft.com/office/drawing/2010/main">
+                <a:solidFill>
+                  <a:srgbClr val="FFFFFF"/>
+                </a:solidFill>
+              </a14:hiddenFill>
+            </a:ext>
+          </a:extLst>
+        </p:spPr>
+      </p:pic>
+      <p:pic>
+        <p:nvPicPr>
+          <p:cNvPr id="1030" name="Picture 6" descr="NuGet Gallery | CommunityToolkit.Mvvm 8.2.2">
+            <a:extLst>
+              <a:ext uri="{FF2B5EF4-FFF2-40B4-BE49-F238E27FC236}">
+                <a16:creationId xmlns:a16="http://schemas.microsoft.com/office/drawing/2014/main" id="{E173E727-BBF4-BB12-C006-79D72462F658}"/>
+              </a:ext>
+            </a:extLst>
+          </p:cNvPr>
+          <p:cNvPicPr>
+            <a:picLocks noChangeAspect="1" noChangeArrowheads="1"/>
+          </p:cNvPicPr>
+          <p:nvPr/>
+        </p:nvPicPr>
+        <p:blipFill>
+          <a:blip r:embed="rId4">
+            <a:extLst>
+              <a:ext uri="{28A0092B-C50C-407E-A947-70E740481C1C}">
+                <a14:useLocalDpi xmlns:a14="http://schemas.microsoft.com/office/drawing/2010/main" val="0"/>
+              </a:ext>
+            </a:extLst>
+          </a:blip>
+          <a:srcRect/>
+          <a:stretch>
+            <a:fillRect/>
+          </a:stretch>
+        </p:blipFill>
+        <p:spPr bwMode="auto">
+          <a:xfrm>
+            <a:off x="4389120" y="5072763"/>
+            <a:ext cx="684624" cy="684624"/>
+          </a:xfrm>
+          <a:prstGeom prst="rect">
+            <a:avLst/>
+          </a:prstGeom>
+          <a:noFill/>
+          <a:extLst>
+            <a:ext uri="{909E8E84-426E-40DD-AFC4-6F175D3DCCD1}">
+              <a14:hiddenFill xmlns:a14="http://schemas.microsoft.com/office/drawing/2010/main">
+                <a:solidFill>
+                  <a:srgbClr val="FFFFFF"/>
+                </a:solidFill>
+              </a14:hiddenFill>
+            </a:ext>
+          </a:extLst>
+        </p:spPr>
+      </p:pic>
+    </p:spTree>
+    <p:extLst>
+      <p:ext uri="{BB962C8B-B14F-4D97-AF65-F5344CB8AC3E}">
+        <p14:creationId xmlns:p14="http://schemas.microsoft.com/office/powerpoint/2010/main" val="3584202487"/>
+      </p:ext>
+    </p:extLst>
+  </p:cSld>
+  <p:clrMapOvr>
+    <a:masterClrMapping/>
+  </p:clrMapOvr>
+</p:sld>
+</file>
+
+<file path=ppt/slides/slide6.xml><?xml version="1.0" encoding="utf-8"?>
+<p:sld xmlns:a="http://schemas.openxmlformats.org/drawingml/2006/main" xmlns:r="http://schemas.openxmlformats.org/officeDocument/2006/relationships" xmlns:p="http://schemas.openxmlformats.org/presentationml/2006/main">
+  <p:cSld>
+    <p:spTree>
+      <p:nvGrpSpPr>
+        <p:cNvPr id="1" name=""/>
+        <p:cNvGrpSpPr/>
+        <p:nvPr/>
+      </p:nvGrpSpPr>
+      <p:grpSpPr>
+        <a:xfrm>
+          <a:off x="0" y="0"/>
+          <a:ext cx="0" cy="0"/>
+          <a:chOff x="0" y="0"/>
+          <a:chExt cx="0" cy="0"/>
+        </a:xfrm>
+      </p:grpSpPr>
+      <p:sp>
+        <p:nvSpPr>
+          <p:cNvPr id="2" name="Titel 1">
+            <a:extLst>
+              <a:ext uri="{FF2B5EF4-FFF2-40B4-BE49-F238E27FC236}">
+                <a16:creationId xmlns:a16="http://schemas.microsoft.com/office/drawing/2014/main" id="{19A59BDD-9E45-29AE-A09C-3FD05F1AF34C}"/>
+              </a:ext>
+            </a:extLst>
+          </p:cNvPr>
+          <p:cNvSpPr>
+            <a:spLocks noGrp="1"/>
+          </p:cNvSpPr>
+          <p:nvPr>
+            <p:ph type="title"/>
+          </p:nvPr>
+        </p:nvSpPr>
+        <p:spPr/>
+        <p:txBody>
+          <a:bodyPr/>
+          <a:lstStyle/>
+          <a:p>
+            <a:r>
+              <a:rPr lang="de-DE" dirty="0"/>
+              <a:t>Umsetzung (III) – Data </a:t>
+            </a:r>
+            <a:r>
+              <a:rPr lang="de-DE" dirty="0" err="1"/>
+              <a:t>Labeling</a:t>
+            </a:r>
+            <a:r>
+              <a:rPr lang="de-DE" dirty="0"/>
+              <a:t> Page</a:t>
+            </a:r>
+            <a:endParaRPr lang="de-AT" dirty="0"/>
+          </a:p>
+        </p:txBody>
+      </p:sp>
+      <p:pic>
+        <p:nvPicPr>
+          <p:cNvPr id="9" name="Inhaltsplatzhalter 8" descr="Ein Bild, das Text, Screenshot, Software, Display enthält.&#10;&#10;Automatisch generierte Beschreibung">
+            <a:extLst>
+              <a:ext uri="{FF2B5EF4-FFF2-40B4-BE49-F238E27FC236}">
+                <a16:creationId xmlns:a16="http://schemas.microsoft.com/office/drawing/2014/main" id="{E8C106C6-8F22-13D4-1ACD-BDEF5B11084E}"/>
+              </a:ext>
+            </a:extLst>
+          </p:cNvPr>
+          <p:cNvPicPr>
+            <a:picLocks noGrp="1" noChangeAspect="1"/>
+          </p:cNvPicPr>
+          <p:nvPr>
+            <p:ph idx="1"/>
+          </p:nvPr>
+        </p:nvPicPr>
+        <p:blipFill>
+          <a:blip r:embed="rId2"/>
+          <a:stretch>
+            <a:fillRect/>
+          </a:stretch>
+        </p:blipFill>
+        <p:spPr>
+          <a:xfrm>
+            <a:off x="438211" y="1914447"/>
+            <a:ext cx="5123363" cy="4037363"/>
+          </a:xfrm>
+        </p:spPr>
+      </p:pic>
+      <p:sp>
+        <p:nvSpPr>
+          <p:cNvPr id="4" name="Datumsplatzhalter 3">
+            <a:extLst>
+              <a:ext uri="{FF2B5EF4-FFF2-40B4-BE49-F238E27FC236}">
+                <a16:creationId xmlns:a16="http://schemas.microsoft.com/office/drawing/2014/main" id="{8741F230-E482-CAE4-9036-C6A4AC1AA488}"/>
+              </a:ext>
+            </a:extLst>
+          </p:cNvPr>
+          <p:cNvSpPr>
+            <a:spLocks noGrp="1"/>
+          </p:cNvSpPr>
+          <p:nvPr>
+            <p:ph type="dt" sz="half" idx="10"/>
+          </p:nvPr>
+        </p:nvSpPr>
+        <p:spPr/>
+        <p:txBody>
+          <a:bodyPr/>
+          <a:lstStyle/>
+          <a:p>
+            <a:pPr rtl="0"/>
+            <a:fld id="{7431362F-B0A5-4ACD-BFD4-85134C5A716E}" type="datetime1">
+              <a:rPr lang="de-DE" noProof="0" smtClean="0"/>
+              <a:t>21.06.2024</a:t>
+            </a:fld>
+            <a:endParaRPr lang="de-DE" noProof="0"/>
+          </a:p>
+        </p:txBody>
+      </p:sp>
+      <p:sp>
+        <p:nvSpPr>
+          <p:cNvPr id="5" name="Fußzeilenplatzhalter 4">
+            <a:extLst>
+              <a:ext uri="{FF2B5EF4-FFF2-40B4-BE49-F238E27FC236}">
+                <a16:creationId xmlns:a16="http://schemas.microsoft.com/office/drawing/2014/main" id="{0F1CAE1D-8FFA-27F3-8ACD-A2F76A8E77A6}"/>
+              </a:ext>
+            </a:extLst>
+          </p:cNvPr>
+          <p:cNvSpPr>
+            <a:spLocks noGrp="1"/>
+          </p:cNvSpPr>
+          <p:nvPr>
+            <p:ph type="ftr" sz="quarter" idx="11"/>
+          </p:nvPr>
+        </p:nvSpPr>
+        <p:spPr/>
+        <p:txBody>
+          <a:bodyPr/>
+          <a:lstStyle/>
+          <a:p>
+            <a:pPr rtl="0"/>
+            <a:r>
+              <a:rPr lang="de-DE" noProof="0"/>
+              <a:t>SmartPen UI V2 - (c) David Reinberger</a:t>
+            </a:r>
+          </a:p>
+        </p:txBody>
+      </p:sp>
+      <p:sp>
+        <p:nvSpPr>
+          <p:cNvPr id="6" name="Foliennummernplatzhalter 5">
+            <a:extLst>
+              <a:ext uri="{FF2B5EF4-FFF2-40B4-BE49-F238E27FC236}">
+                <a16:creationId xmlns:a16="http://schemas.microsoft.com/office/drawing/2014/main" id="{11E8FA70-39C0-D5B4-6D45-886E1CB1D75F}"/>
+              </a:ext>
+            </a:extLst>
+          </p:cNvPr>
+          <p:cNvSpPr>
+            <a:spLocks noGrp="1"/>
+          </p:cNvSpPr>
+          <p:nvPr>
+            <p:ph type="sldNum" sz="quarter" idx="12"/>
+          </p:nvPr>
+        </p:nvSpPr>
+        <p:spPr/>
+        <p:txBody>
+          <a:bodyPr/>
+          <a:lstStyle/>
+          <a:p>
+            <a:pPr rtl="0"/>
+            <a:fld id="{D57F1E4F-1CFF-5643-939E-217C01CDF565}" type="slidenum">
+              <a:rPr lang="de-DE" noProof="0" smtClean="0"/>
+              <a:pPr rtl="0"/>
+              <a:t>6</a:t>
+            </a:fld>
+            <a:endParaRPr lang="de-DE" noProof="0"/>
+          </a:p>
+        </p:txBody>
+      </p:sp>
+      <p:sp>
+        <p:nvSpPr>
+          <p:cNvPr id="7" name="Inhaltsplatzhalter 2">
+            <a:extLst>
+              <a:ext uri="{FF2B5EF4-FFF2-40B4-BE49-F238E27FC236}">
+                <a16:creationId xmlns:a16="http://schemas.microsoft.com/office/drawing/2014/main" id="{75EFB33A-6F69-6807-E044-2E56C4455800}"/>
+              </a:ext>
+            </a:extLst>
+          </p:cNvPr>
+          <p:cNvSpPr txBox="1">
+            <a:spLocks/>
+          </p:cNvSpPr>
+          <p:nvPr/>
+        </p:nvSpPr>
+        <p:spPr>
+          <a:xfrm>
+            <a:off x="6096000" y="2180496"/>
+            <a:ext cx="5514808" cy="3678303"/>
+          </a:xfrm>
+          <a:prstGeom prst="rect">
+            <a:avLst/>
+          </a:prstGeom>
+        </p:spPr>
+        <p:txBody>
+          <a:bodyPr vert="horz" lIns="91440" tIns="45720" rIns="91440" bIns="45720" rtlCol="0" anchor="ctr">
+            <a:normAutofit/>
+          </a:bodyPr>
+          <a:lstStyle>
+            <a:lvl1pPr marL="306000" indent="-306000" algn="l" defTabSz="457200" rtl="0" eaLnBrk="1" latinLnBrk="0" hangingPunct="1">
+              <a:spcBef>
+                <a:spcPct val="20000"/>
+              </a:spcBef>
+              <a:spcAft>
+                <a:spcPts val="600"/>
+              </a:spcAft>
+              <a:buClr>
+                <a:schemeClr val="accent2"/>
+              </a:buClr>
+              <a:buSzPct val="92000"/>
+              <a:buFont typeface="Wingdings 2" panose="05020102010507070707" pitchFamily="18" charset="2"/>
+              <a:buChar char=""/>
+              <a:defRPr sz="1800" kern="1200">
+                <a:solidFill>
+                  <a:schemeClr val="tx2"/>
+                </a:solidFill>
+                <a:latin typeface="+mn-lt"/>
+                <a:ea typeface="+mn-ea"/>
+                <a:cs typeface="+mn-cs"/>
+              </a:defRPr>
+            </a:lvl1pPr>
+            <a:lvl2pPr marL="630000" indent="-306000" algn="l" defTabSz="457200" rtl="0" eaLnBrk="1" latinLnBrk="0" hangingPunct="1">
+              <a:spcBef>
+                <a:spcPct val="20000"/>
+              </a:spcBef>
+              <a:spcAft>
+                <a:spcPts val="600"/>
+              </a:spcAft>
+              <a:buClr>
+                <a:schemeClr val="accent2"/>
+              </a:buClr>
+              <a:buSzPct val="92000"/>
+              <a:buFont typeface="Wingdings 2" panose="05020102010507070707" pitchFamily="18" charset="2"/>
+              <a:buChar char=""/>
+              <a:defRPr sz="1600" kern="1200">
+                <a:solidFill>
+                  <a:schemeClr val="tx2"/>
+                </a:solidFill>
+                <a:latin typeface="+mn-lt"/>
+                <a:ea typeface="+mn-ea"/>
+                <a:cs typeface="+mn-cs"/>
+              </a:defRPr>
+            </a:lvl2pPr>
+            <a:lvl3pPr marL="900000" indent="-270000" algn="l" defTabSz="457200" rtl="0" eaLnBrk="1" latinLnBrk="0" hangingPunct="1">
+              <a:spcBef>
+                <a:spcPct val="20000"/>
+              </a:spcBef>
+              <a:spcAft>
+                <a:spcPts val="600"/>
+              </a:spcAft>
+              <a:buClr>
+                <a:schemeClr val="accent2"/>
+              </a:buClr>
+              <a:buSzPct val="92000"/>
+              <a:buFont typeface="Wingdings 2" panose="05020102010507070707" pitchFamily="18" charset="2"/>
+              <a:buChar char=""/>
+              <a:defRPr sz="1400" kern="1200">
+                <a:solidFill>
+                  <a:schemeClr val="tx2"/>
+                </a:solidFill>
+                <a:latin typeface="+mn-lt"/>
+                <a:ea typeface="+mn-ea"/>
+                <a:cs typeface="+mn-cs"/>
+              </a:defRPr>
+            </a:lvl3pPr>
+            <a:lvl4pPr marL="1242000" indent="-234000" algn="l" defTabSz="457200" rtl="0" eaLnBrk="1" latinLnBrk="0" hangingPunct="1">
+              <a:spcBef>
+                <a:spcPct val="20000"/>
+              </a:spcBef>
+              <a:spcAft>
+                <a:spcPts val="600"/>
+              </a:spcAft>
+              <a:buClr>
+                <a:schemeClr val="accent2"/>
+              </a:buClr>
+              <a:buSzPct val="92000"/>
+              <a:buFont typeface="Wingdings 2" panose="05020102010507070707" pitchFamily="18" charset="2"/>
+              <a:buChar char=""/>
+              <a:defRPr sz="1200" kern="1200">
+                <a:solidFill>
+                  <a:schemeClr val="tx2"/>
+                </a:solidFill>
+                <a:latin typeface="+mn-lt"/>
+                <a:ea typeface="+mn-ea"/>
+                <a:cs typeface="+mn-cs"/>
+              </a:defRPr>
+            </a:lvl4pPr>
+            <a:lvl5pPr marL="1602000" indent="-234000" algn="l" defTabSz="457200" rtl="0" eaLnBrk="1" latinLnBrk="0" hangingPunct="1">
+              <a:spcBef>
+                <a:spcPct val="20000"/>
+              </a:spcBef>
+              <a:spcAft>
+                <a:spcPts val="600"/>
+              </a:spcAft>
+              <a:buClr>
+                <a:schemeClr val="accent2"/>
+              </a:buClr>
+              <a:buSzPct val="92000"/>
+              <a:buFont typeface="Wingdings 2" panose="05020102010507070707" pitchFamily="18" charset="2"/>
+              <a:buChar char=""/>
+              <a:defRPr sz="1200" kern="1200">
+                <a:solidFill>
+                  <a:schemeClr val="tx2"/>
+                </a:solidFill>
+                <a:latin typeface="+mn-lt"/>
+                <a:ea typeface="+mn-ea"/>
+                <a:cs typeface="+mn-cs"/>
+              </a:defRPr>
+            </a:lvl5pPr>
+            <a:lvl6pPr marL="1900000" indent="-228600" algn="l" defTabSz="457200" rtl="0" eaLnBrk="1" latinLnBrk="0" hangingPunct="1">
+              <a:spcBef>
+                <a:spcPct val="20000"/>
+              </a:spcBef>
+              <a:spcAft>
+                <a:spcPts val="600"/>
+              </a:spcAft>
+              <a:buClr>
+                <a:schemeClr val="accent2"/>
+              </a:buClr>
+              <a:buSzPct val="92000"/>
+              <a:buFont typeface="Wingdings 2" panose="05020102010507070707" pitchFamily="18" charset="2"/>
+              <a:buChar char=""/>
+              <a:defRPr sz="1200" kern="1200">
+                <a:solidFill>
+                  <a:schemeClr val="tx2"/>
+                </a:solidFill>
+                <a:latin typeface="+mn-lt"/>
+                <a:ea typeface="+mn-ea"/>
+                <a:cs typeface="+mn-cs"/>
+              </a:defRPr>
+            </a:lvl6pPr>
+            <a:lvl7pPr marL="2200000" indent="-228600" algn="l" defTabSz="457200" rtl="0" eaLnBrk="1" latinLnBrk="0" hangingPunct="1">
+              <a:spcBef>
+                <a:spcPct val="20000"/>
+              </a:spcBef>
+              <a:spcAft>
+                <a:spcPts val="600"/>
+              </a:spcAft>
+              <a:buClr>
+                <a:schemeClr val="accent2"/>
+              </a:buClr>
+              <a:buSzPct val="92000"/>
+              <a:buFont typeface="Wingdings 2" panose="05020102010507070707" pitchFamily="18" charset="2"/>
+              <a:buChar char=""/>
+              <a:defRPr sz="1200" kern="1200">
+                <a:solidFill>
+                  <a:schemeClr val="tx2"/>
+                </a:solidFill>
+                <a:latin typeface="+mn-lt"/>
+                <a:ea typeface="+mn-ea"/>
+                <a:cs typeface="+mn-cs"/>
+              </a:defRPr>
+            </a:lvl7pPr>
+            <a:lvl8pPr marL="2500000" indent="-228600" algn="l" defTabSz="457200" rtl="0" eaLnBrk="1" latinLnBrk="0" hangingPunct="1">
+              <a:spcBef>
+                <a:spcPct val="20000"/>
+              </a:spcBef>
+              <a:spcAft>
+                <a:spcPts val="600"/>
+              </a:spcAft>
+              <a:buClr>
+                <a:schemeClr val="accent2"/>
+              </a:buClr>
+              <a:buSzPct val="92000"/>
+              <a:buFont typeface="Wingdings 2" panose="05020102010507070707" pitchFamily="18" charset="2"/>
+              <a:buChar char=""/>
+              <a:defRPr sz="1200" kern="1200">
+                <a:solidFill>
+                  <a:schemeClr val="tx2"/>
+                </a:solidFill>
+                <a:latin typeface="+mn-lt"/>
+                <a:ea typeface="+mn-ea"/>
+                <a:cs typeface="+mn-cs"/>
+              </a:defRPr>
+            </a:lvl8pPr>
+            <a:lvl9pPr marL="2800000" indent="-228600" algn="l" defTabSz="457200" rtl="0" eaLnBrk="1" latinLnBrk="0" hangingPunct="1">
+              <a:spcBef>
+                <a:spcPct val="20000"/>
+              </a:spcBef>
+              <a:spcAft>
+                <a:spcPts val="600"/>
+              </a:spcAft>
+              <a:buClr>
+                <a:schemeClr val="accent2"/>
+              </a:buClr>
+              <a:buSzPct val="92000"/>
+              <a:buFont typeface="Wingdings 2" panose="05020102010507070707" pitchFamily="18" charset="2"/>
+              <a:buChar char=""/>
+              <a:defRPr sz="1200" kern="1200">
+                <a:solidFill>
+                  <a:schemeClr val="tx2"/>
+                </a:solidFill>
+                <a:latin typeface="+mn-lt"/>
+                <a:ea typeface="+mn-ea"/>
+                <a:cs typeface="+mn-cs"/>
+              </a:defRPr>
+            </a:lvl9pPr>
+          </a:lstStyle>
+          <a:p>
             <a:endParaRPr lang="de-AT" dirty="0"/>
           </a:p>
         </p:txBody>
@@ -8099,7 +8406,7 @@
             <a:pPr rtl="0"/>
             <a:fld id="{7431362F-B0A5-4ACD-BFD4-85134C5A716E}" type="datetime1">
               <a:rPr lang="de-DE" noProof="0" smtClean="0"/>
-              <a:t>20.06.2024</a:t>
+              <a:t>21.06.2024</a:t>
             </a:fld>
             <a:endParaRPr lang="de-DE" noProof="0"/>
           </a:p>
@@ -8341,7 +8648,7 @@
             <a:pPr rtl="0"/>
             <a:fld id="{7431362F-B0A5-4ACD-BFD4-85134C5A716E}" type="datetime1">
               <a:rPr lang="de-DE" noProof="0" smtClean="0"/>
-              <a:t>20.06.2024</a:t>
+              <a:t>21.06.2024</a:t>
             </a:fld>
             <a:endParaRPr lang="de-DE" noProof="0"/>
           </a:p>
@@ -8614,7 +8921,7 @@
             <a:pPr rtl="0"/>
             <a:fld id="{7431362F-B0A5-4ACD-BFD4-85134C5A716E}" type="datetime1">
               <a:rPr lang="de-DE" noProof="0" smtClean="0"/>
-              <a:t>20.06.2024</a:t>
+              <a:t>21.06.2024</a:t>
             </a:fld>
             <a:endParaRPr lang="de-DE" noProof="0"/>
           </a:p>

</xml_diff>